<commit_message>
Update Template - MwRSF Standard Presentation.pptx
</commit_message>
<xml_diff>
--- a/Template - MwRSF Standard Presentation.pptx
+++ b/Template - MwRSF Standard Presentation.pptx
@@ -5,14 +5,17 @@
     <p:sldMasterId id="2147483707" r:id="rId1"/>
   </p:sldMasterIdLst>
   <p:notesMasterIdLst>
-    <p:notesMasterId r:id="rId4"/>
+    <p:notesMasterId r:id="rId7"/>
   </p:notesMasterIdLst>
   <p:handoutMasterIdLst>
-    <p:handoutMasterId r:id="rId5"/>
+    <p:handoutMasterId r:id="rId8"/>
   </p:handoutMasterIdLst>
   <p:sldIdLst>
     <p:sldId id="293" r:id="rId2"/>
     <p:sldId id="339" r:id="rId3"/>
+    <p:sldId id="341" r:id="rId4"/>
+    <p:sldId id="340" r:id="rId5"/>
+    <p:sldId id="342" r:id="rId6"/>
   </p:sldIdLst>
   <p:sldSz cx="9144000" cy="6858000" type="screen4x3"/>
   <p:notesSz cx="6934200" cy="9232900"/>
@@ -141,6 +144,36 @@
       </a:defRPr>
     </a:lvl9pPr>
   </p:defaultTextStyle>
+  <p:extLst>
+    <p:ext uri="{EFAFB233-063F-42B5-8137-9DF3F51BA10A}">
+      <p15:sldGuideLst xmlns:p15="http://schemas.microsoft.com/office/powerpoint/2012/main">
+        <p15:guide id="1" orient="horz" pos="2160">
+          <p15:clr>
+            <a:srgbClr val="A4A3A4"/>
+          </p15:clr>
+        </p15:guide>
+        <p15:guide id="2" pos="2880">
+          <p15:clr>
+            <a:srgbClr val="A4A3A4"/>
+          </p15:clr>
+        </p15:guide>
+      </p15:sldGuideLst>
+    </p:ext>
+    <p:ext uri="{2D200454-40CA-4A62-9FC3-DE9A4176ACB9}">
+      <p15:notesGuideLst xmlns:p15="http://schemas.microsoft.com/office/powerpoint/2012/main">
+        <p15:guide id="1" orient="horz" pos="2909">
+          <p15:clr>
+            <a:srgbClr val="A4A3A4"/>
+          </p15:clr>
+        </p15:guide>
+        <p15:guide id="2" pos="2184">
+          <p15:clr>
+            <a:srgbClr val="A4A3A4"/>
+          </p15:clr>
+        </p15:guide>
+      </p15:notesGuideLst>
+    </p:ext>
+  </p:extLst>
 </p:presentation>
 </file>
 
@@ -563,35 +596,35 @@
           <a:p>
             <a:pPr lvl="0"/>
             <a:r>
-              <a:rPr lang="en-US" noProof="0" smtClean="0"/>
+              <a:rPr lang="en-US" noProof="0"/>
               <a:t>Click to edit Master text styles</a:t>
             </a:r>
           </a:p>
           <a:p>
             <a:pPr lvl="1"/>
             <a:r>
-              <a:rPr lang="en-US" noProof="0" smtClean="0"/>
+              <a:rPr lang="en-US" noProof="0"/>
               <a:t>Second level</a:t>
             </a:r>
           </a:p>
           <a:p>
             <a:pPr lvl="2"/>
             <a:r>
-              <a:rPr lang="en-US" noProof="0" smtClean="0"/>
+              <a:rPr lang="en-US" noProof="0"/>
               <a:t>Third level</a:t>
             </a:r>
           </a:p>
           <a:p>
             <a:pPr lvl="3"/>
             <a:r>
-              <a:rPr lang="en-US" noProof="0" smtClean="0"/>
+              <a:rPr lang="en-US" noProof="0"/>
               <a:t>Fourth level</a:t>
             </a:r>
           </a:p>
           <a:p>
             <a:pPr lvl="4"/>
             <a:r>
-              <a:rPr lang="en-US" noProof="0" smtClean="0"/>
+              <a:rPr lang="en-US" noProof="0"/>
               <a:t>Fifth level</a:t>
             </a:r>
           </a:p>
@@ -985,7 +1018,7 @@
               <a:pPr/>
               <a:t>1</a:t>
             </a:fld>
-            <a:endParaRPr lang="en-US" smtClean="0"/>
+            <a:endParaRPr lang="en-US"/>
           </a:p>
         </p:txBody>
       </p:sp>
@@ -1041,7 +1074,7 @@
           <a:lstStyle/>
           <a:p>
             <a:pPr eaLnBrk="1" hangingPunct="1"/>
-            <a:endParaRPr lang="en-US" dirty="0" smtClean="0"/>
+            <a:endParaRPr lang="en-US" dirty="0"/>
           </a:p>
         </p:txBody>
       </p:sp>
@@ -1121,7 +1154,7 @@
           <a:bodyPr/>
           <a:lstStyle/>
           <a:p>
-            <a:endParaRPr lang="en-US" dirty="0" smtClean="0"/>
+            <a:endParaRPr lang="en-US" dirty="0"/>
           </a:p>
         </p:txBody>
       </p:sp>
@@ -1264,11 +1297,191 @@
               <a:pPr/>
               <a:t>2</a:t>
             </a:fld>
-            <a:endParaRPr lang="en-US" smtClean="0"/>
+            <a:endParaRPr lang="en-US"/>
           </a:p>
         </p:txBody>
       </p:sp>
     </p:spTree>
+  </p:cSld>
+  <p:clrMapOvr>
+    <a:masterClrMapping/>
+  </p:clrMapOvr>
+</p:notes>
+</file>
+
+<file path=ppt/notesSlides/notesSlide3.xml><?xml version="1.0" encoding="utf-8"?>
+<p:notes xmlns:a="http://schemas.openxmlformats.org/drawingml/2006/main" xmlns:r="http://schemas.openxmlformats.org/officeDocument/2006/relationships" xmlns:p="http://schemas.openxmlformats.org/presentationml/2006/main">
+  <p:cSld>
+    <p:spTree>
+      <p:nvGrpSpPr>
+        <p:cNvPr id="1" name=""/>
+        <p:cNvGrpSpPr/>
+        <p:nvPr/>
+      </p:nvGrpSpPr>
+      <p:grpSpPr>
+        <a:xfrm>
+          <a:off x="0" y="0"/>
+          <a:ext cx="0" cy="0"/>
+          <a:chOff x="0" y="0"/>
+          <a:chExt cx="0" cy="0"/>
+        </a:xfrm>
+      </p:grpSpPr>
+      <p:sp>
+        <p:nvSpPr>
+          <p:cNvPr id="2" name="Slide Image Placeholder 1"/>
+          <p:cNvSpPr>
+            <a:spLocks noGrp="1" noRot="1" noChangeAspect="1"/>
+          </p:cNvSpPr>
+          <p:nvPr>
+            <p:ph type="sldImg"/>
+          </p:nvPr>
+        </p:nvSpPr>
+        <p:spPr/>
+      </p:sp>
+      <p:sp>
+        <p:nvSpPr>
+          <p:cNvPr id="3" name="Notes Placeholder 2"/>
+          <p:cNvSpPr>
+            <a:spLocks noGrp="1"/>
+          </p:cNvSpPr>
+          <p:nvPr>
+            <p:ph type="body" idx="1"/>
+          </p:nvPr>
+        </p:nvSpPr>
+        <p:spPr/>
+        <p:txBody>
+          <a:bodyPr/>
+          <a:lstStyle/>
+          <a:p>
+            <a:endParaRPr lang="en-US" dirty="0"/>
+          </a:p>
+        </p:txBody>
+      </p:sp>
+      <p:sp>
+        <p:nvSpPr>
+          <p:cNvPr id="4" name="Slide Number Placeholder 3"/>
+          <p:cNvSpPr>
+            <a:spLocks noGrp="1"/>
+          </p:cNvSpPr>
+          <p:nvPr>
+            <p:ph type="sldNum" sz="quarter" idx="5"/>
+          </p:nvPr>
+        </p:nvSpPr>
+        <p:spPr/>
+        <p:txBody>
+          <a:bodyPr/>
+          <a:lstStyle/>
+          <a:p>
+            <a:pPr>
+              <a:defRPr/>
+            </a:pPr>
+            <a:fld id="{1173D4E6-5411-4646-A04A-D6E513EF5E48}" type="slidenum">
+              <a:rPr lang="en-US" smtClean="0"/>
+              <a:pPr>
+                <a:defRPr/>
+              </a:pPr>
+              <a:t>3</a:t>
+            </a:fld>
+            <a:endParaRPr lang="en-US"/>
+          </a:p>
+        </p:txBody>
+      </p:sp>
+    </p:spTree>
+    <p:extLst>
+      <p:ext uri="{BB962C8B-B14F-4D97-AF65-F5344CB8AC3E}">
+        <p14:creationId xmlns:p14="http://schemas.microsoft.com/office/powerpoint/2010/main" val="206457724"/>
+      </p:ext>
+    </p:extLst>
+  </p:cSld>
+  <p:clrMapOvr>
+    <a:masterClrMapping/>
+  </p:clrMapOvr>
+</p:notes>
+</file>
+
+<file path=ppt/notesSlides/notesSlide4.xml><?xml version="1.0" encoding="utf-8"?>
+<p:notes xmlns:a="http://schemas.openxmlformats.org/drawingml/2006/main" xmlns:r="http://schemas.openxmlformats.org/officeDocument/2006/relationships" xmlns:p="http://schemas.openxmlformats.org/presentationml/2006/main">
+  <p:cSld>
+    <p:spTree>
+      <p:nvGrpSpPr>
+        <p:cNvPr id="1" name=""/>
+        <p:cNvGrpSpPr/>
+        <p:nvPr/>
+      </p:nvGrpSpPr>
+      <p:grpSpPr>
+        <a:xfrm>
+          <a:off x="0" y="0"/>
+          <a:ext cx="0" cy="0"/>
+          <a:chOff x="0" y="0"/>
+          <a:chExt cx="0" cy="0"/>
+        </a:xfrm>
+      </p:grpSpPr>
+      <p:sp>
+        <p:nvSpPr>
+          <p:cNvPr id="2" name="Slide Image Placeholder 1"/>
+          <p:cNvSpPr>
+            <a:spLocks noGrp="1" noRot="1" noChangeAspect="1"/>
+          </p:cNvSpPr>
+          <p:nvPr>
+            <p:ph type="sldImg"/>
+          </p:nvPr>
+        </p:nvSpPr>
+        <p:spPr/>
+      </p:sp>
+      <p:sp>
+        <p:nvSpPr>
+          <p:cNvPr id="3" name="Notes Placeholder 2"/>
+          <p:cNvSpPr>
+            <a:spLocks noGrp="1"/>
+          </p:cNvSpPr>
+          <p:nvPr>
+            <p:ph type="body" idx="1"/>
+          </p:nvPr>
+        </p:nvSpPr>
+        <p:spPr/>
+        <p:txBody>
+          <a:bodyPr/>
+          <a:lstStyle/>
+          <a:p>
+            <a:endParaRPr lang="en-US" dirty="0"/>
+          </a:p>
+        </p:txBody>
+      </p:sp>
+      <p:sp>
+        <p:nvSpPr>
+          <p:cNvPr id="4" name="Slide Number Placeholder 3"/>
+          <p:cNvSpPr>
+            <a:spLocks noGrp="1"/>
+          </p:cNvSpPr>
+          <p:nvPr>
+            <p:ph type="sldNum" sz="quarter" idx="5"/>
+          </p:nvPr>
+        </p:nvSpPr>
+        <p:spPr/>
+        <p:txBody>
+          <a:bodyPr/>
+          <a:lstStyle/>
+          <a:p>
+            <a:pPr>
+              <a:defRPr/>
+            </a:pPr>
+            <a:fld id="{1173D4E6-5411-4646-A04A-D6E513EF5E48}" type="slidenum">
+              <a:rPr lang="en-US" smtClean="0"/>
+              <a:pPr>
+                <a:defRPr/>
+              </a:pPr>
+              <a:t>4</a:t>
+            </a:fld>
+            <a:endParaRPr lang="en-US"/>
+          </a:p>
+        </p:txBody>
+      </p:sp>
+    </p:spTree>
+    <p:extLst>
+      <p:ext uri="{BB962C8B-B14F-4D97-AF65-F5344CB8AC3E}">
+        <p14:creationId xmlns:p14="http://schemas.microsoft.com/office/powerpoint/2010/main" val="2546138126"/>
+      </p:ext>
+    </p:extLst>
   </p:cSld>
   <p:clrMapOvr>
     <a:masterClrMapping/>
@@ -1965,10 +2178,9 @@
           <a:lstStyle/>
           <a:p>
             <a:r>
-              <a:rPr lang="en-US" smtClean="0"/>
+              <a:rPr lang="en-US"/>
               <a:t>Click to edit Master title style</a:t>
             </a:r>
-            <a:endParaRPr lang="en-US"/>
           </a:p>
         </p:txBody>
       </p:sp>
@@ -1989,38 +2201,37 @@
           <a:p>
             <a:pPr lvl="0"/>
             <a:r>
-              <a:rPr lang="en-US" smtClean="0"/>
+              <a:rPr lang="en-US"/>
               <a:t>Click to edit Master text styles</a:t>
             </a:r>
           </a:p>
           <a:p>
             <a:pPr lvl="1"/>
             <a:r>
-              <a:rPr lang="en-US" smtClean="0"/>
+              <a:rPr lang="en-US"/>
               <a:t>Second level</a:t>
             </a:r>
           </a:p>
           <a:p>
             <a:pPr lvl="2"/>
             <a:r>
-              <a:rPr lang="en-US" smtClean="0"/>
+              <a:rPr lang="en-US"/>
               <a:t>Third level</a:t>
             </a:r>
           </a:p>
           <a:p>
             <a:pPr lvl="3"/>
             <a:r>
-              <a:rPr lang="en-US" smtClean="0"/>
+              <a:rPr lang="en-US"/>
               <a:t>Fourth level</a:t>
             </a:r>
           </a:p>
           <a:p>
             <a:pPr lvl="4"/>
             <a:r>
-              <a:rPr lang="en-US" smtClean="0"/>
+              <a:rPr lang="en-US"/>
               <a:t>Fifth level</a:t>
             </a:r>
-            <a:endParaRPr lang="en-US"/>
           </a:p>
         </p:txBody>
       </p:sp>
@@ -2166,10 +2377,9 @@
           <a:lstStyle/>
           <a:p>
             <a:r>
-              <a:rPr lang="en-US" smtClean="0"/>
+              <a:rPr lang="en-US"/>
               <a:t>Click to edit Master title style</a:t>
             </a:r>
-            <a:endParaRPr lang="en-US"/>
           </a:p>
         </p:txBody>
       </p:sp>
@@ -2195,38 +2405,37 @@
           <a:p>
             <a:pPr lvl="0"/>
             <a:r>
-              <a:rPr lang="en-US" smtClean="0"/>
+              <a:rPr lang="en-US"/>
               <a:t>Click to edit Master text styles</a:t>
             </a:r>
           </a:p>
           <a:p>
             <a:pPr lvl="1"/>
             <a:r>
-              <a:rPr lang="en-US" smtClean="0"/>
+              <a:rPr lang="en-US"/>
               <a:t>Second level</a:t>
             </a:r>
           </a:p>
           <a:p>
             <a:pPr lvl="2"/>
             <a:r>
-              <a:rPr lang="en-US" smtClean="0"/>
+              <a:rPr lang="en-US"/>
               <a:t>Third level</a:t>
             </a:r>
           </a:p>
           <a:p>
             <a:pPr lvl="3"/>
             <a:r>
-              <a:rPr lang="en-US" smtClean="0"/>
+              <a:rPr lang="en-US"/>
               <a:t>Fourth level</a:t>
             </a:r>
           </a:p>
           <a:p>
             <a:pPr lvl="4"/>
             <a:r>
-              <a:rPr lang="en-US" smtClean="0"/>
+              <a:rPr lang="en-US"/>
               <a:t>Fifth level</a:t>
             </a:r>
-            <a:endParaRPr lang="en-US"/>
           </a:p>
         </p:txBody>
       </p:sp>
@@ -2367,10 +2576,9 @@
           <a:lstStyle/>
           <a:p>
             <a:r>
-              <a:rPr lang="en-US" smtClean="0"/>
+              <a:rPr lang="en-US"/>
               <a:t>Click to edit Master title style</a:t>
             </a:r>
-            <a:endParaRPr lang="en-US"/>
           </a:p>
         </p:txBody>
       </p:sp>
@@ -2391,38 +2599,37 @@
           <a:p>
             <a:pPr lvl="0"/>
             <a:r>
-              <a:rPr lang="en-US" smtClean="0"/>
+              <a:rPr lang="en-US"/>
               <a:t>Click to edit Master text styles</a:t>
             </a:r>
           </a:p>
           <a:p>
             <a:pPr lvl="1"/>
             <a:r>
-              <a:rPr lang="en-US" smtClean="0"/>
+              <a:rPr lang="en-US"/>
               <a:t>Second level</a:t>
             </a:r>
           </a:p>
           <a:p>
             <a:pPr lvl="2"/>
             <a:r>
-              <a:rPr lang="en-US" smtClean="0"/>
+              <a:rPr lang="en-US"/>
               <a:t>Third level</a:t>
             </a:r>
           </a:p>
           <a:p>
             <a:pPr lvl="3"/>
             <a:r>
-              <a:rPr lang="en-US" smtClean="0"/>
+              <a:rPr lang="en-US"/>
               <a:t>Fourth level</a:t>
             </a:r>
           </a:p>
           <a:p>
             <a:pPr lvl="4"/>
             <a:r>
-              <a:rPr lang="en-US" smtClean="0"/>
+              <a:rPr lang="en-US"/>
               <a:t>Fifth level</a:t>
             </a:r>
-            <a:endParaRPr lang="en-US"/>
           </a:p>
         </p:txBody>
       </p:sp>
@@ -2572,10 +2779,9 @@
           </a:lstStyle>
           <a:p>
             <a:r>
-              <a:rPr lang="en-US" smtClean="0"/>
+              <a:rPr lang="en-US"/>
               <a:t>Click to edit Master title style</a:t>
             </a:r>
-            <a:endParaRPr lang="en-US"/>
           </a:p>
         </p:txBody>
       </p:sp>
@@ -2638,7 +2844,7 @@
           <a:p>
             <a:pPr lvl="0"/>
             <a:r>
-              <a:rPr lang="en-US" smtClean="0"/>
+              <a:rPr lang="en-US"/>
               <a:t>Click to edit Master text styles</a:t>
             </a:r>
           </a:p>
@@ -2781,10 +2987,9 @@
           <a:lstStyle/>
           <a:p>
             <a:r>
-              <a:rPr lang="en-US" smtClean="0"/>
+              <a:rPr lang="en-US"/>
               <a:t>Click to edit Master title style</a:t>
             </a:r>
-            <a:endParaRPr lang="en-US"/>
           </a:p>
         </p:txBody>
       </p:sp>
@@ -2838,38 +3043,37 @@
           <a:p>
             <a:pPr lvl="0"/>
             <a:r>
-              <a:rPr lang="en-US" smtClean="0"/>
+              <a:rPr lang="en-US"/>
               <a:t>Click to edit Master text styles</a:t>
             </a:r>
           </a:p>
           <a:p>
             <a:pPr lvl="1"/>
             <a:r>
-              <a:rPr lang="en-US" smtClean="0"/>
+              <a:rPr lang="en-US"/>
               <a:t>Second level</a:t>
             </a:r>
           </a:p>
           <a:p>
             <a:pPr lvl="2"/>
             <a:r>
-              <a:rPr lang="en-US" smtClean="0"/>
+              <a:rPr lang="en-US"/>
               <a:t>Third level</a:t>
             </a:r>
           </a:p>
           <a:p>
             <a:pPr lvl="3"/>
             <a:r>
-              <a:rPr lang="en-US" smtClean="0"/>
+              <a:rPr lang="en-US"/>
               <a:t>Fourth level</a:t>
             </a:r>
           </a:p>
           <a:p>
             <a:pPr lvl="4"/>
             <a:r>
-              <a:rPr lang="en-US" smtClean="0"/>
+              <a:rPr lang="en-US"/>
               <a:t>Fifth level</a:t>
             </a:r>
-            <a:endParaRPr lang="en-US"/>
           </a:p>
         </p:txBody>
       </p:sp>
@@ -2923,38 +3127,37 @@
           <a:p>
             <a:pPr lvl="0"/>
             <a:r>
-              <a:rPr lang="en-US" smtClean="0"/>
+              <a:rPr lang="en-US"/>
               <a:t>Click to edit Master text styles</a:t>
             </a:r>
           </a:p>
           <a:p>
             <a:pPr lvl="1"/>
             <a:r>
-              <a:rPr lang="en-US" smtClean="0"/>
+              <a:rPr lang="en-US"/>
               <a:t>Second level</a:t>
             </a:r>
           </a:p>
           <a:p>
             <a:pPr lvl="2"/>
             <a:r>
-              <a:rPr lang="en-US" smtClean="0"/>
+              <a:rPr lang="en-US"/>
               <a:t>Third level</a:t>
             </a:r>
           </a:p>
           <a:p>
             <a:pPr lvl="3"/>
             <a:r>
-              <a:rPr lang="en-US" smtClean="0"/>
+              <a:rPr lang="en-US"/>
               <a:t>Fourth level</a:t>
             </a:r>
           </a:p>
           <a:p>
             <a:pPr lvl="4"/>
             <a:r>
-              <a:rPr lang="en-US" smtClean="0"/>
+              <a:rPr lang="en-US"/>
               <a:t>Fifth level</a:t>
             </a:r>
-            <a:endParaRPr lang="en-US"/>
           </a:p>
         </p:txBody>
       </p:sp>
@@ -3104,10 +3307,9 @@
           </a:lstStyle>
           <a:p>
             <a:r>
-              <a:rPr lang="en-US" smtClean="0"/>
+              <a:rPr lang="en-US"/>
               <a:t>Click to edit Master title style</a:t>
             </a:r>
-            <a:endParaRPr lang="en-US"/>
           </a:p>
         </p:txBody>
       </p:sp>
@@ -3170,7 +3372,7 @@
           <a:p>
             <a:pPr lvl="0"/>
             <a:r>
-              <a:rPr lang="en-US" smtClean="0"/>
+              <a:rPr lang="en-US"/>
               <a:t>Click to edit Master text styles</a:t>
             </a:r>
           </a:p>
@@ -3226,38 +3428,37 @@
           <a:p>
             <a:pPr lvl="0"/>
             <a:r>
-              <a:rPr lang="en-US" smtClean="0"/>
+              <a:rPr lang="en-US"/>
               <a:t>Click to edit Master text styles</a:t>
             </a:r>
           </a:p>
           <a:p>
             <a:pPr lvl="1"/>
             <a:r>
-              <a:rPr lang="en-US" smtClean="0"/>
+              <a:rPr lang="en-US"/>
               <a:t>Second level</a:t>
             </a:r>
           </a:p>
           <a:p>
             <a:pPr lvl="2"/>
             <a:r>
-              <a:rPr lang="en-US" smtClean="0"/>
+              <a:rPr lang="en-US"/>
               <a:t>Third level</a:t>
             </a:r>
           </a:p>
           <a:p>
             <a:pPr lvl="3"/>
             <a:r>
-              <a:rPr lang="en-US" smtClean="0"/>
+              <a:rPr lang="en-US"/>
               <a:t>Fourth level</a:t>
             </a:r>
           </a:p>
           <a:p>
             <a:pPr lvl="4"/>
             <a:r>
-              <a:rPr lang="en-US" smtClean="0"/>
+              <a:rPr lang="en-US"/>
               <a:t>Fifth level</a:t>
             </a:r>
-            <a:endParaRPr lang="en-US"/>
           </a:p>
         </p:txBody>
       </p:sp>
@@ -3320,7 +3521,7 @@
           <a:p>
             <a:pPr lvl="0"/>
             <a:r>
-              <a:rPr lang="en-US" smtClean="0"/>
+              <a:rPr lang="en-US"/>
               <a:t>Click to edit Master text styles</a:t>
             </a:r>
           </a:p>
@@ -3376,38 +3577,37 @@
           <a:p>
             <a:pPr lvl="0"/>
             <a:r>
-              <a:rPr lang="en-US" smtClean="0"/>
+              <a:rPr lang="en-US"/>
               <a:t>Click to edit Master text styles</a:t>
             </a:r>
           </a:p>
           <a:p>
             <a:pPr lvl="1"/>
             <a:r>
-              <a:rPr lang="en-US" smtClean="0"/>
+              <a:rPr lang="en-US"/>
               <a:t>Second level</a:t>
             </a:r>
           </a:p>
           <a:p>
             <a:pPr lvl="2"/>
             <a:r>
-              <a:rPr lang="en-US" smtClean="0"/>
+              <a:rPr lang="en-US"/>
               <a:t>Third level</a:t>
             </a:r>
           </a:p>
           <a:p>
             <a:pPr lvl="3"/>
             <a:r>
-              <a:rPr lang="en-US" smtClean="0"/>
+              <a:rPr lang="en-US"/>
               <a:t>Fourth level</a:t>
             </a:r>
           </a:p>
           <a:p>
             <a:pPr lvl="4"/>
             <a:r>
-              <a:rPr lang="en-US" smtClean="0"/>
+              <a:rPr lang="en-US"/>
               <a:t>Fifth level</a:t>
             </a:r>
-            <a:endParaRPr lang="en-US"/>
           </a:p>
         </p:txBody>
       </p:sp>
@@ -3548,10 +3748,9 @@
           <a:lstStyle/>
           <a:p>
             <a:r>
-              <a:rPr lang="en-US" smtClean="0"/>
+              <a:rPr lang="en-US"/>
               <a:t>Click to edit Master title style</a:t>
             </a:r>
-            <a:endParaRPr lang="en-US"/>
           </a:p>
         </p:txBody>
       </p:sp>
@@ -3822,10 +4021,9 @@
           </a:lstStyle>
           <a:p>
             <a:r>
-              <a:rPr lang="en-US" smtClean="0"/>
+              <a:rPr lang="en-US"/>
               <a:t>Click to edit Master title style</a:t>
             </a:r>
-            <a:endParaRPr lang="en-US"/>
           </a:p>
         </p:txBody>
       </p:sp>
@@ -3879,38 +4077,37 @@
           <a:p>
             <a:pPr lvl="0"/>
             <a:r>
-              <a:rPr lang="en-US" smtClean="0"/>
+              <a:rPr lang="en-US"/>
               <a:t>Click to edit Master text styles</a:t>
             </a:r>
           </a:p>
           <a:p>
             <a:pPr lvl="1"/>
             <a:r>
-              <a:rPr lang="en-US" smtClean="0"/>
+              <a:rPr lang="en-US"/>
               <a:t>Second level</a:t>
             </a:r>
           </a:p>
           <a:p>
             <a:pPr lvl="2"/>
             <a:r>
-              <a:rPr lang="en-US" smtClean="0"/>
+              <a:rPr lang="en-US"/>
               <a:t>Third level</a:t>
             </a:r>
           </a:p>
           <a:p>
             <a:pPr lvl="3"/>
             <a:r>
-              <a:rPr lang="en-US" smtClean="0"/>
+              <a:rPr lang="en-US"/>
               <a:t>Fourth level</a:t>
             </a:r>
           </a:p>
           <a:p>
             <a:pPr lvl="4"/>
             <a:r>
-              <a:rPr lang="en-US" smtClean="0"/>
+              <a:rPr lang="en-US"/>
               <a:t>Fifth level</a:t>
             </a:r>
-            <a:endParaRPr lang="en-US"/>
           </a:p>
         </p:txBody>
       </p:sp>
@@ -3973,7 +4170,7 @@
           <a:p>
             <a:pPr lvl="0"/>
             <a:r>
-              <a:rPr lang="en-US" smtClean="0"/>
+              <a:rPr lang="en-US"/>
               <a:t>Click to edit Master text styles</a:t>
             </a:r>
           </a:p>
@@ -4125,10 +4322,9 @@
           </a:lstStyle>
           <a:p>
             <a:r>
-              <a:rPr lang="en-US" smtClean="0"/>
+              <a:rPr lang="en-US"/>
               <a:t>Click to edit Master title style</a:t>
             </a:r>
-            <a:endParaRPr lang="en-US"/>
           </a:p>
         </p:txBody>
       </p:sp>
@@ -4190,7 +4386,7 @@
           </a:lstStyle>
           <a:p>
             <a:pPr lvl="0"/>
-            <a:endParaRPr lang="en-US" noProof="0" smtClean="0"/>
+            <a:endParaRPr lang="en-US" noProof="0"/>
           </a:p>
         </p:txBody>
       </p:sp>
@@ -4253,7 +4449,7 @@
           <a:p>
             <a:pPr lvl="0"/>
             <a:r>
-              <a:rPr lang="en-US" smtClean="0"/>
+              <a:rPr lang="en-US"/>
               <a:t>Click to edit Master text styles</a:t>
             </a:r>
           </a:p>
@@ -4983,7 +5179,7 @@
           <a:p>
             <a:pPr lvl="0"/>
             <a:r>
-              <a:rPr lang="en-US" smtClean="0"/>
+              <a:rPr lang="en-US"/>
               <a:t>Click to edit Master title style</a:t>
             </a:r>
           </a:p>
@@ -5041,35 +5237,35 @@
           <a:p>
             <a:pPr lvl="0"/>
             <a:r>
-              <a:rPr lang="en-US" smtClean="0"/>
+              <a:rPr lang="en-US"/>
               <a:t>Click to edit Master text styles</a:t>
             </a:r>
           </a:p>
           <a:p>
             <a:pPr lvl="1"/>
             <a:r>
-              <a:rPr lang="en-US" smtClean="0"/>
+              <a:rPr lang="en-US"/>
               <a:t>Second level</a:t>
             </a:r>
           </a:p>
           <a:p>
             <a:pPr lvl="2"/>
             <a:r>
-              <a:rPr lang="en-US" smtClean="0"/>
+              <a:rPr lang="en-US"/>
               <a:t>Third level</a:t>
             </a:r>
           </a:p>
           <a:p>
             <a:pPr lvl="3"/>
             <a:r>
-              <a:rPr lang="en-US" smtClean="0"/>
+              <a:rPr lang="en-US"/>
               <a:t>Fourth level</a:t>
             </a:r>
           </a:p>
           <a:p>
             <a:pPr lvl="4"/>
             <a:r>
-              <a:rPr lang="en-US" smtClean="0"/>
+              <a:rPr lang="en-US"/>
               <a:t>Fifth level</a:t>
             </a:r>
           </a:p>
@@ -5748,8 +5944,8 @@
           <a:p>
             <a:pPr algn="ctr" eaLnBrk="1" hangingPunct="1"/>
             <a:r>
-              <a:rPr lang="en-US" sz="4400" dirty="0" smtClean="0"/>
-              <a:t>Presentation Title</a:t>
+              <a:rPr lang="en-US" sz="4400" dirty="0"/>
+              <a:t>Research Update</a:t>
             </a:r>
           </a:p>
         </p:txBody>
@@ -5780,8 +5976,8 @@
               </a:lnSpc>
             </a:pPr>
             <a:r>
-              <a:rPr lang="en-US" sz="2800" b="1" dirty="0" smtClean="0"/>
-              <a:t>Name</a:t>
+              <a:rPr lang="en-US" sz="2800" b="1" dirty="0"/>
+              <a:t>Ricardo Jacome</a:t>
             </a:r>
           </a:p>
           <a:p>
@@ -5790,7 +5986,7 @@
                 <a:spcPct val="80000"/>
               </a:lnSpc>
             </a:pPr>
-            <a:endParaRPr lang="en-US" sz="2400" dirty="0" smtClean="0"/>
+            <a:endParaRPr lang="en-US" sz="2400" dirty="0"/>
           </a:p>
           <a:p>
             <a:pPr eaLnBrk="1" hangingPunct="1">
@@ -5799,7 +5995,7 @@
               </a:lnSpc>
             </a:pPr>
             <a:r>
-              <a:rPr lang="en-US" sz="2400" dirty="0" smtClean="0"/>
+              <a:rPr lang="en-US" sz="2400" dirty="0"/>
               <a:t>Midwest Roadside Safety Facility </a:t>
             </a:r>
           </a:p>
@@ -5810,7 +6006,7 @@
               </a:lnSpc>
             </a:pPr>
             <a:r>
-              <a:rPr lang="en-US" sz="2400" dirty="0" smtClean="0"/>
+              <a:rPr lang="en-US" sz="2400" dirty="0"/>
               <a:t>University of Nebraska-Lincoln</a:t>
             </a:r>
           </a:p>
@@ -5820,7 +6016,7 @@
                 <a:spcPct val="80000"/>
               </a:lnSpc>
             </a:pPr>
-            <a:endParaRPr lang="en-US" sz="2400" dirty="0" smtClean="0"/>
+            <a:endParaRPr lang="en-US" sz="2400" dirty="0"/>
           </a:p>
           <a:p>
             <a:pPr eaLnBrk="1" hangingPunct="1">
@@ -5829,7 +6025,7 @@
               </a:lnSpc>
             </a:pPr>
             <a:r>
-              <a:rPr lang="en-US" sz="2400" dirty="0" smtClean="0"/>
+              <a:rPr lang="en-US" sz="2400" dirty="0"/>
               <a:t>Meeting</a:t>
             </a:r>
           </a:p>
@@ -5840,8 +6036,8 @@
               </a:lnSpc>
             </a:pPr>
             <a:r>
-              <a:rPr lang="en-US" sz="2400" dirty="0" smtClean="0"/>
-              <a:t>Date</a:t>
+              <a:rPr lang="en-US" sz="2400" dirty="0"/>
+              <a:t>04/15/2020</a:t>
             </a:r>
           </a:p>
           <a:p>
@@ -5850,7 +6046,7 @@
                 <a:spcPct val="80000"/>
               </a:lnSpc>
             </a:pPr>
-            <a:endParaRPr lang="en-US" sz="2800" dirty="0" smtClean="0"/>
+            <a:endParaRPr lang="en-US" sz="2800" dirty="0"/>
           </a:p>
         </p:txBody>
       </p:sp>
@@ -5924,13 +6120,6 @@
     <a:masterClrMapping/>
   </p:clrMapOvr>
   <p:transition/>
-  <p:timing>
-    <p:tnLst>
-      <p:par>
-        <p:cTn id="1" dur="indefinite" restart="never" nodeType="tmRoot"/>
-      </p:par>
-    </p:tnLst>
-  </p:timing>
 </p:sld>
 </file>
 
@@ -5973,48 +6162,1670 @@
           <a:p>
             <a:pPr eaLnBrk="1" hangingPunct="1"/>
             <a:r>
-              <a:rPr lang="en-US" sz="4000" dirty="0" smtClean="0"/>
-              <a:t>Title</a:t>
+              <a:rPr lang="en-US" sz="4000" dirty="0"/>
+              <a:t>Publication Done</a:t>
             </a:r>
           </a:p>
         </p:txBody>
       </p:sp>
-      <p:sp>
-        <p:nvSpPr>
-          <p:cNvPr id="4099" name="Content Placeholder 2"/>
-          <p:cNvSpPr>
-            <a:spLocks noGrp="1"/>
-          </p:cNvSpPr>
+      <p:pic>
+        <p:nvPicPr>
+          <p:cNvPr id="2" name="Content Placeholder 1">
+            <a:extLst>
+              <a:ext uri="{FF2B5EF4-FFF2-40B4-BE49-F238E27FC236}">
+                <a16:creationId xmlns:a16="http://schemas.microsoft.com/office/drawing/2014/main" id="{464498B7-D452-4150-89AA-DE84705BCEDD}"/>
+              </a:ext>
+            </a:extLst>
+          </p:cNvPr>
+          <p:cNvPicPr>
+            <a:picLocks noGrp="1" noChangeAspect="1"/>
+          </p:cNvPicPr>
           <p:nvPr>
             <p:ph idx="1"/>
           </p:nvPr>
-        </p:nvSpPr>
+        </p:nvPicPr>
+        <p:blipFill>
+          <a:blip r:embed="rId3"/>
+          <a:stretch>
+            <a:fillRect/>
+          </a:stretch>
+        </p:blipFill>
         <p:spPr>
           <a:xfrm>
-            <a:off x="457200" y="1495425"/>
-            <a:ext cx="8229600" cy="5185791"/>
+            <a:off x="1204144" y="2038803"/>
+            <a:ext cx="6754762" cy="2102280"/>
           </a:xfrm>
-        </p:spPr>
+          <a:prstGeom prst="rect">
+            <a:avLst/>
+          </a:prstGeom>
+        </p:spPr>
+      </p:pic>
+      <p:sp>
+        <p:nvSpPr>
+          <p:cNvPr id="3" name="TextBox 2">
+            <a:extLst>
+              <a:ext uri="{FF2B5EF4-FFF2-40B4-BE49-F238E27FC236}">
+                <a16:creationId xmlns:a16="http://schemas.microsoft.com/office/drawing/2014/main" id="{B6C3889D-66EC-4B93-A849-288509521C88}"/>
+              </a:ext>
+            </a:extLst>
+          </p:cNvPr>
+          <p:cNvSpPr txBox="1"/>
+          <p:nvPr/>
+        </p:nvSpPr>
+        <p:spPr>
+          <a:xfrm>
+            <a:off x="789040" y="1536410"/>
+            <a:ext cx="3008671" cy="369332"/>
+          </a:xfrm>
+          <a:prstGeom prst="rect">
+            <a:avLst/>
+          </a:prstGeom>
+          <a:noFill/>
+        </p:spPr>
+        <p:txBody>
+          <a:bodyPr wrap="square" rtlCol="0">
+            <a:spAutoFit/>
+          </a:bodyPr>
+          <a:lstStyle/>
+          <a:p>
+            <a:r>
+              <a:rPr lang="en-US" dirty="0"/>
+              <a:t>Published Yesterday!</a:t>
+            </a:r>
+          </a:p>
+        </p:txBody>
+      </p:sp>
+      <p:pic>
+        <p:nvPicPr>
+          <p:cNvPr id="1026" name="Picture 2" descr="Happy stick figures celebrating New Year night icon. Men and women firework, serpentine, sparkler pictogram Stock Vector - 110220755">
+            <a:extLst>
+              <a:ext uri="{FF2B5EF4-FFF2-40B4-BE49-F238E27FC236}">
+                <a16:creationId xmlns:a16="http://schemas.microsoft.com/office/drawing/2014/main" id="{8619056C-4F88-4B0A-8991-12F24AAAE96E}"/>
+              </a:ext>
+            </a:extLst>
+          </p:cNvPr>
+          <p:cNvPicPr>
+            <a:picLocks noChangeAspect="1" noChangeArrowheads="1"/>
+          </p:cNvPicPr>
+          <p:nvPr/>
+        </p:nvPicPr>
+        <p:blipFill rotWithShape="1">
+          <a:blip r:embed="rId4">
+            <a:extLst>
+              <a:ext uri="{28A0092B-C50C-407E-A947-70E740481C1C}">
+                <a14:useLocalDpi xmlns:a14="http://schemas.microsoft.com/office/drawing/2010/main" val="0"/>
+              </a:ext>
+            </a:extLst>
+          </a:blip>
+          <a:srcRect t="7090"/>
+          <a:stretch/>
+        </p:blipFill>
+        <p:spPr bwMode="auto">
+          <a:xfrm>
+            <a:off x="1743074" y="4122174"/>
+            <a:ext cx="5889215" cy="2735826"/>
+          </a:xfrm>
+          <a:prstGeom prst="rect">
+            <a:avLst/>
+          </a:prstGeom>
+          <a:noFill/>
+          <a:extLst>
+            <a:ext uri="{909E8E84-426E-40DD-AFC4-6F175D3DCCD1}">
+              <a14:hiddenFill xmlns:a14="http://schemas.microsoft.com/office/drawing/2010/main">
+                <a:solidFill>
+                  <a:srgbClr val="FFFFFF"/>
+                </a:solidFill>
+              </a14:hiddenFill>
+            </a:ext>
+          </a:extLst>
+        </p:spPr>
+      </p:pic>
+    </p:spTree>
+  </p:cSld>
+  <p:clrMapOvr>
+    <a:masterClrMapping/>
+  </p:clrMapOvr>
+</p:sld>
+</file>
+
+<file path=ppt/slides/slide3.xml><?xml version="1.0" encoding="utf-8"?>
+<p:sld xmlns:a="http://schemas.openxmlformats.org/drawingml/2006/main" xmlns:r="http://schemas.openxmlformats.org/officeDocument/2006/relationships" xmlns:p="http://schemas.openxmlformats.org/presentationml/2006/main">
+  <p:cSld>
+    <p:spTree>
+      <p:nvGrpSpPr>
+        <p:cNvPr id="1" name=""/>
+        <p:cNvGrpSpPr/>
+        <p:nvPr/>
+      </p:nvGrpSpPr>
+      <p:grpSpPr>
+        <a:xfrm>
+          <a:off x="0" y="0"/>
+          <a:ext cx="0" cy="0"/>
+          <a:chOff x="0" y="0"/>
+          <a:chExt cx="0" cy="0"/>
+        </a:xfrm>
+      </p:grpSpPr>
+      <p:sp>
+        <p:nvSpPr>
+          <p:cNvPr id="2" name="Title 1">
+            <a:extLst>
+              <a:ext uri="{FF2B5EF4-FFF2-40B4-BE49-F238E27FC236}">
+                <a16:creationId xmlns:a16="http://schemas.microsoft.com/office/drawing/2014/main" id="{0CDFB761-72D2-4057-9573-B4D1A0932B20}"/>
+              </a:ext>
+            </a:extLst>
+          </p:cNvPr>
+          <p:cNvSpPr>
+            <a:spLocks noGrp="1"/>
+          </p:cNvSpPr>
+          <p:nvPr>
+            <p:ph type="title"/>
+          </p:nvPr>
+        </p:nvSpPr>
+        <p:spPr/>
         <p:txBody>
           <a:bodyPr/>
           <a:lstStyle/>
           <a:p>
-            <a:pPr eaLnBrk="1" hangingPunct="1"/>
             <a:r>
-              <a:rPr lang="en-US" dirty="0" smtClean="0"/>
-              <a:t>Bullet 1</a:t>
+              <a:rPr lang="en-US" dirty="0"/>
+              <a:t>Now… Next Publication</a:t>
             </a:r>
           </a:p>
-          <a:p>
-            <a:pPr eaLnBrk="1" hangingPunct="1"/>
+        </p:txBody>
+      </p:sp>
+      <p:sp>
+        <p:nvSpPr>
+          <p:cNvPr id="3" name="Content Placeholder 2">
+            <a:extLst>
+              <a:ext uri="{FF2B5EF4-FFF2-40B4-BE49-F238E27FC236}">
+                <a16:creationId xmlns:a16="http://schemas.microsoft.com/office/drawing/2014/main" id="{B7FE8A25-C435-451F-B37F-4811F8473633}"/>
+              </a:ext>
+            </a:extLst>
+          </p:cNvPr>
+          <p:cNvSpPr>
+            <a:spLocks noGrp="1"/>
+          </p:cNvSpPr>
+          <p:nvPr>
+            <p:ph idx="1"/>
+          </p:nvPr>
+        </p:nvSpPr>
+        <p:spPr>
+          <a:xfrm>
+            <a:off x="457200" y="1485900"/>
+            <a:ext cx="8229600" cy="881216"/>
+          </a:xfrm>
+        </p:spPr>
+        <p:txBody>
+          <a:bodyPr/>
+          <a:lstStyle/>
+          <a:p>
             <a:r>
-              <a:rPr lang="en-US" dirty="0" smtClean="0"/>
-              <a:t>Bullet 2</a:t>
+              <a:rPr lang="en-US" dirty="0"/>
+              <a:t> Road Curvature Model Optimization </a:t>
             </a:r>
           </a:p>
-        </p:txBody>
-      </p:sp>
+          <a:p>
+            <a:endParaRPr lang="en-US" dirty="0"/>
+          </a:p>
+        </p:txBody>
+      </p:sp>
+      <p:pic>
+        <p:nvPicPr>
+          <p:cNvPr id="5" name="Picture 4" descr="A close up of a logo&#10;&#10;Description automatically generated">
+            <a:extLst>
+              <a:ext uri="{FF2B5EF4-FFF2-40B4-BE49-F238E27FC236}">
+                <a16:creationId xmlns:a16="http://schemas.microsoft.com/office/drawing/2014/main" id="{52FD6834-A87E-4F61-BA3A-28DC596FE552}"/>
+              </a:ext>
+            </a:extLst>
+          </p:cNvPr>
+          <p:cNvPicPr>
+            <a:picLocks noChangeAspect="1"/>
+          </p:cNvPicPr>
+          <p:nvPr/>
+        </p:nvPicPr>
+        <p:blipFill>
+          <a:blip r:embed="rId3">
+            <a:extLst>
+              <a:ext uri="{28A0092B-C50C-407E-A947-70E740481C1C}">
+                <a14:useLocalDpi xmlns:a14="http://schemas.microsoft.com/office/drawing/2010/main" val="0"/>
+              </a:ext>
+            </a:extLst>
+          </a:blip>
+          <a:stretch>
+            <a:fillRect/>
+          </a:stretch>
+        </p:blipFill>
+        <p:spPr>
+          <a:xfrm>
+            <a:off x="2853459" y="2547462"/>
+            <a:ext cx="2817295" cy="3993447"/>
+          </a:xfrm>
+          <a:prstGeom prst="rect">
+            <a:avLst/>
+          </a:prstGeom>
+        </p:spPr>
+      </p:pic>
     </p:spTree>
+    <p:extLst>
+      <p:ext uri="{BB962C8B-B14F-4D97-AF65-F5344CB8AC3E}">
+        <p14:creationId xmlns:p14="http://schemas.microsoft.com/office/powerpoint/2010/main" val="2345823943"/>
+      </p:ext>
+    </p:extLst>
+  </p:cSld>
+  <p:clrMapOvr>
+    <a:masterClrMapping/>
+  </p:clrMapOvr>
+</p:sld>
+</file>
+
+<file path=ppt/slides/slide4.xml><?xml version="1.0" encoding="utf-8"?>
+<p:sld xmlns:a="http://schemas.openxmlformats.org/drawingml/2006/main" xmlns:r="http://schemas.openxmlformats.org/officeDocument/2006/relationships" xmlns:p="http://schemas.openxmlformats.org/presentationml/2006/main">
+  <p:cSld>
+    <p:spTree>
+      <p:nvGrpSpPr>
+        <p:cNvPr id="1" name=""/>
+        <p:cNvGrpSpPr/>
+        <p:nvPr/>
+      </p:nvGrpSpPr>
+      <p:grpSpPr>
+        <a:xfrm>
+          <a:off x="0" y="0"/>
+          <a:ext cx="0" cy="0"/>
+          <a:chOff x="0" y="0"/>
+          <a:chExt cx="0" cy="0"/>
+        </a:xfrm>
+      </p:grpSpPr>
+      <p:sp>
+        <p:nvSpPr>
+          <p:cNvPr id="2" name="Title 1">
+            <a:extLst>
+              <a:ext uri="{FF2B5EF4-FFF2-40B4-BE49-F238E27FC236}">
+                <a16:creationId xmlns:a16="http://schemas.microsoft.com/office/drawing/2014/main" id="{F41E42BA-CCFD-44B2-A9EE-BDB6CBE6414C}"/>
+              </a:ext>
+            </a:extLst>
+          </p:cNvPr>
+          <p:cNvSpPr>
+            <a:spLocks noGrp="1"/>
+          </p:cNvSpPr>
+          <p:nvPr>
+            <p:ph type="title"/>
+          </p:nvPr>
+        </p:nvSpPr>
+        <p:spPr/>
+        <p:txBody>
+          <a:bodyPr/>
+          <a:lstStyle/>
+          <a:p>
+            <a:r>
+              <a:rPr lang="en-US" dirty="0"/>
+              <a:t>Overview</a:t>
+            </a:r>
+          </a:p>
+        </p:txBody>
+      </p:sp>
+      <p:sp>
+        <p:nvSpPr>
+          <p:cNvPr id="5" name="TextBox 4">
+            <a:extLst>
+              <a:ext uri="{FF2B5EF4-FFF2-40B4-BE49-F238E27FC236}">
+                <a16:creationId xmlns:a16="http://schemas.microsoft.com/office/drawing/2014/main" id="{5BC9EB81-FDD0-4CAD-B0F5-16D6F82B6051}"/>
+              </a:ext>
+            </a:extLst>
+          </p:cNvPr>
+          <p:cNvSpPr txBox="1"/>
+          <p:nvPr/>
+        </p:nvSpPr>
+        <p:spPr>
+          <a:xfrm>
+            <a:off x="516193" y="1723340"/>
+            <a:ext cx="1814052" cy="646331"/>
+          </a:xfrm>
+          <a:prstGeom prst="rect">
+            <a:avLst/>
+          </a:prstGeom>
+          <a:noFill/>
+          <a:ln w="25400">
+            <a:solidFill>
+              <a:schemeClr val="accent1"/>
+            </a:solidFill>
+          </a:ln>
+        </p:spPr>
+        <p:txBody>
+          <a:bodyPr wrap="square" rtlCol="0">
+            <a:spAutoFit/>
+          </a:bodyPr>
+          <a:lstStyle/>
+          <a:p>
+            <a:r>
+              <a:rPr lang="en-US" dirty="0"/>
+              <a:t>Road Curvature Decomposition </a:t>
+            </a:r>
+          </a:p>
+        </p:txBody>
+      </p:sp>
+      <p:sp>
+        <p:nvSpPr>
+          <p:cNvPr id="6" name="TextBox 5">
+            <a:extLst>
+              <a:ext uri="{FF2B5EF4-FFF2-40B4-BE49-F238E27FC236}">
+                <a16:creationId xmlns:a16="http://schemas.microsoft.com/office/drawing/2014/main" id="{5676C31B-47DC-4CC4-AFD1-79C3E0CA125A}"/>
+              </a:ext>
+            </a:extLst>
+          </p:cNvPr>
+          <p:cNvSpPr txBox="1"/>
+          <p:nvPr/>
+        </p:nvSpPr>
+        <p:spPr>
+          <a:xfrm>
+            <a:off x="2628899" y="3528246"/>
+            <a:ext cx="1814052" cy="646331"/>
+          </a:xfrm>
+          <a:prstGeom prst="rect">
+            <a:avLst/>
+          </a:prstGeom>
+          <a:noFill/>
+          <a:ln w="25400">
+            <a:solidFill>
+              <a:schemeClr val="accent1"/>
+            </a:solidFill>
+          </a:ln>
+        </p:spPr>
+        <p:txBody>
+          <a:bodyPr wrap="square" rtlCol="0">
+            <a:spAutoFit/>
+          </a:bodyPr>
+          <a:lstStyle/>
+          <a:p>
+            <a:r>
+              <a:rPr lang="en-US" dirty="0"/>
+              <a:t>Least Squares Optimization </a:t>
+            </a:r>
+          </a:p>
+        </p:txBody>
+      </p:sp>
+      <p:cxnSp>
+        <p:nvCxnSpPr>
+          <p:cNvPr id="8" name="Straight Arrow Connector 7">
+            <a:extLst>
+              <a:ext uri="{FF2B5EF4-FFF2-40B4-BE49-F238E27FC236}">
+                <a16:creationId xmlns:a16="http://schemas.microsoft.com/office/drawing/2014/main" id="{0DB1C096-3A89-42DD-894F-5A1E9130A370}"/>
+              </a:ext>
+            </a:extLst>
+          </p:cNvPr>
+          <p:cNvCxnSpPr>
+            <a:cxnSpLocks/>
+            <a:stCxn id="5" idx="3"/>
+            <a:endCxn id="6" idx="1"/>
+          </p:cNvCxnSpPr>
+          <p:nvPr/>
+        </p:nvCxnSpPr>
+        <p:spPr bwMode="auto">
+          <a:xfrm>
+            <a:off x="2330245" y="2046506"/>
+            <a:ext cx="298654" cy="1804906"/>
+          </a:xfrm>
+          <a:prstGeom prst="straightConnector1">
+            <a:avLst/>
+          </a:prstGeom>
+          <a:solidFill>
+            <a:schemeClr val="accent1"/>
+          </a:solidFill>
+          <a:ln w="38100" cap="flat" cmpd="sng" algn="ctr">
+            <a:solidFill>
+              <a:schemeClr val="tx2"/>
+            </a:solidFill>
+            <a:prstDash val="solid"/>
+            <a:round/>
+            <a:headEnd type="none" w="med" len="med"/>
+            <a:tailEnd type="triangle"/>
+          </a:ln>
+          <a:effectLst/>
+        </p:spPr>
+      </p:cxnSp>
+      <p:sp>
+        <p:nvSpPr>
+          <p:cNvPr id="10" name="TextBox 9">
+            <a:extLst>
+              <a:ext uri="{FF2B5EF4-FFF2-40B4-BE49-F238E27FC236}">
+                <a16:creationId xmlns:a16="http://schemas.microsoft.com/office/drawing/2014/main" id="{69BADC4F-B598-48CC-9712-403214C366D1}"/>
+              </a:ext>
+            </a:extLst>
+          </p:cNvPr>
+          <p:cNvSpPr txBox="1"/>
+          <p:nvPr/>
+        </p:nvSpPr>
+        <p:spPr>
+          <a:xfrm>
+            <a:off x="516193" y="5041411"/>
+            <a:ext cx="1814052" cy="646331"/>
+          </a:xfrm>
+          <a:prstGeom prst="rect">
+            <a:avLst/>
+          </a:prstGeom>
+          <a:noFill/>
+          <a:ln w="25400">
+            <a:solidFill>
+              <a:schemeClr val="accent1"/>
+            </a:solidFill>
+          </a:ln>
+        </p:spPr>
+        <p:txBody>
+          <a:bodyPr wrap="square" rtlCol="0">
+            <a:spAutoFit/>
+          </a:bodyPr>
+          <a:lstStyle/>
+          <a:p>
+            <a:r>
+              <a:rPr lang="en-US" dirty="0"/>
+              <a:t>Analytical Models </a:t>
+            </a:r>
+          </a:p>
+        </p:txBody>
+      </p:sp>
+      <p:cxnSp>
+        <p:nvCxnSpPr>
+          <p:cNvPr id="11" name="Straight Arrow Connector 10">
+            <a:extLst>
+              <a:ext uri="{FF2B5EF4-FFF2-40B4-BE49-F238E27FC236}">
+                <a16:creationId xmlns:a16="http://schemas.microsoft.com/office/drawing/2014/main" id="{F2A4E9D5-000B-4878-80FD-428F3EED3D37}"/>
+              </a:ext>
+            </a:extLst>
+          </p:cNvPr>
+          <p:cNvCxnSpPr>
+            <a:cxnSpLocks/>
+            <a:stCxn id="10" idx="3"/>
+            <a:endCxn id="6" idx="1"/>
+          </p:cNvCxnSpPr>
+          <p:nvPr/>
+        </p:nvCxnSpPr>
+        <p:spPr bwMode="auto">
+          <a:xfrm flipV="1">
+            <a:off x="2330245" y="3851412"/>
+            <a:ext cx="298654" cy="1513165"/>
+          </a:xfrm>
+          <a:prstGeom prst="straightConnector1">
+            <a:avLst/>
+          </a:prstGeom>
+          <a:solidFill>
+            <a:schemeClr val="accent1"/>
+          </a:solidFill>
+          <a:ln w="38100" cap="flat" cmpd="sng" algn="ctr">
+            <a:solidFill>
+              <a:schemeClr val="tx2"/>
+            </a:solidFill>
+            <a:prstDash val="solid"/>
+            <a:round/>
+            <a:headEnd type="none" w="med" len="med"/>
+            <a:tailEnd type="triangle"/>
+          </a:ln>
+          <a:effectLst/>
+        </p:spPr>
+      </p:cxnSp>
+      <p:sp>
+        <p:nvSpPr>
+          <p:cNvPr id="29" name="TextBox 28">
+            <a:extLst>
+              <a:ext uri="{FF2B5EF4-FFF2-40B4-BE49-F238E27FC236}">
+                <a16:creationId xmlns:a16="http://schemas.microsoft.com/office/drawing/2014/main" id="{D094E912-0376-4987-9152-B430648CBEFA}"/>
+              </a:ext>
+            </a:extLst>
+          </p:cNvPr>
+          <p:cNvSpPr txBox="1"/>
+          <p:nvPr/>
+        </p:nvSpPr>
+        <p:spPr>
+          <a:xfrm>
+            <a:off x="5357357" y="3528245"/>
+            <a:ext cx="1814052" cy="646331"/>
+          </a:xfrm>
+          <a:prstGeom prst="rect">
+            <a:avLst/>
+          </a:prstGeom>
+          <a:noFill/>
+          <a:ln w="25400">
+            <a:solidFill>
+              <a:schemeClr val="accent1"/>
+            </a:solidFill>
+          </a:ln>
+        </p:spPr>
+        <p:txBody>
+          <a:bodyPr wrap="square" rtlCol="0">
+            <a:spAutoFit/>
+          </a:bodyPr>
+          <a:lstStyle/>
+          <a:p>
+            <a:r>
+              <a:rPr lang="en-US" dirty="0"/>
+              <a:t>Non-Linear Optimization </a:t>
+            </a:r>
+          </a:p>
+        </p:txBody>
+      </p:sp>
+      <p:cxnSp>
+        <p:nvCxnSpPr>
+          <p:cNvPr id="30" name="Straight Arrow Connector 29">
+            <a:extLst>
+              <a:ext uri="{FF2B5EF4-FFF2-40B4-BE49-F238E27FC236}">
+                <a16:creationId xmlns:a16="http://schemas.microsoft.com/office/drawing/2014/main" id="{B7A2C239-D965-4178-A852-6B0E977F8ED8}"/>
+              </a:ext>
+            </a:extLst>
+          </p:cNvPr>
+          <p:cNvCxnSpPr>
+            <a:cxnSpLocks/>
+            <a:stCxn id="6" idx="3"/>
+            <a:endCxn id="29" idx="1"/>
+          </p:cNvCxnSpPr>
+          <p:nvPr/>
+        </p:nvCxnSpPr>
+        <p:spPr bwMode="auto">
+          <a:xfrm flipV="1">
+            <a:off x="4442951" y="3851411"/>
+            <a:ext cx="914406" cy="1"/>
+          </a:xfrm>
+          <a:prstGeom prst="straightConnector1">
+            <a:avLst/>
+          </a:prstGeom>
+          <a:solidFill>
+            <a:schemeClr val="accent1"/>
+          </a:solidFill>
+          <a:ln w="38100" cap="flat" cmpd="sng" algn="ctr">
+            <a:solidFill>
+              <a:schemeClr val="tx2"/>
+            </a:solidFill>
+            <a:prstDash val="solid"/>
+            <a:round/>
+            <a:headEnd type="none" w="med" len="med"/>
+            <a:tailEnd type="triangle"/>
+          </a:ln>
+          <a:effectLst/>
+        </p:spPr>
+      </p:cxnSp>
+      <mc:AlternateContent xmlns:mc="http://schemas.openxmlformats.org/markup-compatibility/2006">
+        <mc:Choice xmlns:a14="http://schemas.microsoft.com/office/drawing/2010/main" Requires="a14">
+          <p:sp>
+            <p:nvSpPr>
+              <p:cNvPr id="35" name="TextBox 34">
+                <a:extLst>
+                  <a:ext uri="{FF2B5EF4-FFF2-40B4-BE49-F238E27FC236}">
+                    <a16:creationId xmlns:a16="http://schemas.microsoft.com/office/drawing/2014/main" id="{7B1E8493-074C-4868-98E1-CEC03E828B9B}"/>
+                  </a:ext>
+                </a:extLst>
+              </p:cNvPr>
+              <p:cNvSpPr txBox="1"/>
+              <p:nvPr/>
+            </p:nvSpPr>
+            <p:spPr>
+              <a:xfrm>
+                <a:off x="2470353" y="2512583"/>
+                <a:ext cx="612058" cy="369332"/>
+              </a:xfrm>
+              <a:prstGeom prst="rect">
+                <a:avLst/>
+              </a:prstGeom>
+              <a:noFill/>
+            </p:spPr>
+            <p:txBody>
+              <a:bodyPr wrap="square" rtlCol="0">
+                <a:spAutoFit/>
+              </a:bodyPr>
+              <a:lstStyle/>
+              <a:p>
+                <a14:m>
+                  <m:oMathPara xmlns:m="http://schemas.openxmlformats.org/officeDocument/2006/math">
+                    <m:oMathParaPr>
+                      <m:jc m:val="centerGroup"/>
+                    </m:oMathParaPr>
+                    <m:oMath xmlns:m="http://schemas.openxmlformats.org/officeDocument/2006/math">
+                      <m:r>
+                        <a:rPr lang="en-US" b="0" i="1" smtClean="0">
+                          <a:latin typeface="Cambria Math" panose="02040503050406030204" pitchFamily="18" charset="0"/>
+                        </a:rPr>
+                        <m:t>𝜅</m:t>
+                      </m:r>
+                      <m:r>
+                        <a:rPr lang="en-US" b="0" i="1" smtClean="0">
+                          <a:latin typeface="Cambria Math" panose="02040503050406030204" pitchFamily="18" charset="0"/>
+                        </a:rPr>
+                        <m:t>[</m:t>
+                      </m:r>
+                      <m:r>
+                        <a:rPr lang="en-US" b="0" i="1" smtClean="0">
+                          <a:latin typeface="Cambria Math" panose="02040503050406030204" pitchFamily="18" charset="0"/>
+                        </a:rPr>
+                        <m:t>𝑠</m:t>
+                      </m:r>
+                      <m:r>
+                        <a:rPr lang="en-US" b="0" i="1" smtClean="0">
+                          <a:latin typeface="Cambria Math" panose="02040503050406030204" pitchFamily="18" charset="0"/>
+                        </a:rPr>
+                        <m:t>]</m:t>
+                      </m:r>
+                    </m:oMath>
+                  </m:oMathPara>
+                </a14:m>
+                <a:endParaRPr lang="en-US" dirty="0"/>
+              </a:p>
+            </p:txBody>
+          </p:sp>
+        </mc:Choice>
+        <mc:Fallback>
+          <p:sp>
+            <p:nvSpPr>
+              <p:cNvPr id="35" name="TextBox 34">
+                <a:extLst>
+                  <a:ext uri="{FF2B5EF4-FFF2-40B4-BE49-F238E27FC236}">
+                    <a16:creationId xmlns:a16="http://schemas.microsoft.com/office/drawing/2014/main" id="{7B1E8493-074C-4868-98E1-CEC03E828B9B}"/>
+                  </a:ext>
+                </a:extLst>
+              </p:cNvPr>
+              <p:cNvSpPr txBox="1">
+                <a:spLocks noRot="1" noChangeAspect="1" noMove="1" noResize="1" noEditPoints="1" noAdjustHandles="1" noChangeArrowheads="1" noChangeShapeType="1" noTextEdit="1"/>
+              </p:cNvSpPr>
+              <p:nvPr/>
+            </p:nvSpPr>
+            <p:spPr>
+              <a:xfrm>
+                <a:off x="2470353" y="2512583"/>
+                <a:ext cx="612058" cy="369332"/>
+              </a:xfrm>
+              <a:prstGeom prst="rect">
+                <a:avLst/>
+              </a:prstGeom>
+              <a:blipFill>
+                <a:blip r:embed="rId3"/>
+                <a:stretch>
+                  <a:fillRect r="-990" b="-16393"/>
+                </a:stretch>
+              </a:blipFill>
+            </p:spPr>
+            <p:txBody>
+              <a:bodyPr/>
+              <a:lstStyle/>
+              <a:p>
+                <a:r>
+                  <a:rPr lang="en-US">
+                    <a:noFill/>
+                  </a:rPr>
+                  <a:t> </a:t>
+                </a:r>
+              </a:p>
+            </p:txBody>
+          </p:sp>
+        </mc:Fallback>
+      </mc:AlternateContent>
+      <mc:AlternateContent xmlns:mc="http://schemas.openxmlformats.org/markup-compatibility/2006">
+        <mc:Choice xmlns:a14="http://schemas.microsoft.com/office/drawing/2010/main" Requires="a14">
+          <p:sp>
+            <p:nvSpPr>
+              <p:cNvPr id="36" name="TextBox 35">
+                <a:extLst>
+                  <a:ext uri="{FF2B5EF4-FFF2-40B4-BE49-F238E27FC236}">
+                    <a16:creationId xmlns:a16="http://schemas.microsoft.com/office/drawing/2014/main" id="{ACD197E2-C78F-4F9C-97FC-A90FCCA60AA7}"/>
+                  </a:ext>
+                </a:extLst>
+              </p:cNvPr>
+              <p:cNvSpPr txBox="1"/>
+              <p:nvPr/>
+            </p:nvSpPr>
+            <p:spPr>
+              <a:xfrm>
+                <a:off x="2330245" y="4538060"/>
+                <a:ext cx="862780" cy="369332"/>
+              </a:xfrm>
+              <a:prstGeom prst="rect">
+                <a:avLst/>
+              </a:prstGeom>
+              <a:noFill/>
+            </p:spPr>
+            <p:txBody>
+              <a:bodyPr wrap="square" rtlCol="0">
+                <a:spAutoFit/>
+              </a:bodyPr>
+              <a:lstStyle/>
+              <a:p>
+                <a14:m>
+                  <m:oMathPara xmlns:m="http://schemas.openxmlformats.org/officeDocument/2006/math">
+                    <m:oMathParaPr>
+                      <m:jc m:val="centerGroup"/>
+                    </m:oMathParaPr>
+                    <m:oMath xmlns:m="http://schemas.openxmlformats.org/officeDocument/2006/math">
+                      <m:r>
+                        <a:rPr lang="en-US" b="0" i="1" smtClean="0">
+                          <a:latin typeface="Cambria Math" panose="02040503050406030204" pitchFamily="18" charset="0"/>
+                        </a:rPr>
+                        <m:t>𝜅</m:t>
+                      </m:r>
+                      <m:r>
+                        <a:rPr lang="en-US" b="0" i="1" smtClean="0">
+                          <a:latin typeface="Cambria Math" panose="02040503050406030204" pitchFamily="18" charset="0"/>
+                        </a:rPr>
+                        <m:t>(</m:t>
+                      </m:r>
+                      <m:r>
+                        <a:rPr lang="en-US" b="0" i="1" smtClean="0">
+                          <a:latin typeface="Cambria Math" panose="02040503050406030204" pitchFamily="18" charset="0"/>
+                        </a:rPr>
+                        <m:t>𝑠</m:t>
+                      </m:r>
+                      <m:r>
+                        <a:rPr lang="en-US" b="0" i="1" smtClean="0">
+                          <a:latin typeface="Cambria Math" panose="02040503050406030204" pitchFamily="18" charset="0"/>
+                        </a:rPr>
+                        <m:t>)</m:t>
+                      </m:r>
+                    </m:oMath>
+                  </m:oMathPara>
+                </a14:m>
+                <a:endParaRPr lang="en-US" dirty="0"/>
+              </a:p>
+            </p:txBody>
+          </p:sp>
+        </mc:Choice>
+        <mc:Fallback>
+          <p:sp>
+            <p:nvSpPr>
+              <p:cNvPr id="36" name="TextBox 35">
+                <a:extLst>
+                  <a:ext uri="{FF2B5EF4-FFF2-40B4-BE49-F238E27FC236}">
+                    <a16:creationId xmlns:a16="http://schemas.microsoft.com/office/drawing/2014/main" id="{ACD197E2-C78F-4F9C-97FC-A90FCCA60AA7}"/>
+                  </a:ext>
+                </a:extLst>
+              </p:cNvPr>
+              <p:cNvSpPr txBox="1">
+                <a:spLocks noRot="1" noChangeAspect="1" noMove="1" noResize="1" noEditPoints="1" noAdjustHandles="1" noChangeArrowheads="1" noChangeShapeType="1" noTextEdit="1"/>
+              </p:cNvSpPr>
+              <p:nvPr/>
+            </p:nvSpPr>
+            <p:spPr>
+              <a:xfrm>
+                <a:off x="2330245" y="4538060"/>
+                <a:ext cx="862780" cy="369332"/>
+              </a:xfrm>
+              <a:prstGeom prst="rect">
+                <a:avLst/>
+              </a:prstGeom>
+              <a:blipFill>
+                <a:blip r:embed="rId4"/>
+                <a:stretch>
+                  <a:fillRect b="-14754"/>
+                </a:stretch>
+              </a:blipFill>
+            </p:spPr>
+            <p:txBody>
+              <a:bodyPr/>
+              <a:lstStyle/>
+              <a:p>
+                <a:r>
+                  <a:rPr lang="en-US">
+                    <a:noFill/>
+                  </a:rPr>
+                  <a:t> </a:t>
+                </a:r>
+              </a:p>
+            </p:txBody>
+          </p:sp>
+        </mc:Fallback>
+      </mc:AlternateContent>
+      <p:sp>
+        <p:nvSpPr>
+          <p:cNvPr id="37" name="TextBox 36">
+            <a:extLst>
+              <a:ext uri="{FF2B5EF4-FFF2-40B4-BE49-F238E27FC236}">
+                <a16:creationId xmlns:a16="http://schemas.microsoft.com/office/drawing/2014/main" id="{5A597AE6-DEE2-47FB-A93B-E3F8DE3BE459}"/>
+              </a:ext>
+            </a:extLst>
+          </p:cNvPr>
+          <p:cNvSpPr txBox="1"/>
+          <p:nvPr/>
+        </p:nvSpPr>
+        <p:spPr>
+          <a:xfrm>
+            <a:off x="777977" y="2438883"/>
+            <a:ext cx="1238865" cy="1089363"/>
+          </a:xfrm>
+          <a:prstGeom prst="rect">
+            <a:avLst/>
+          </a:prstGeom>
+          <a:noFill/>
+          <a:ln w="25400" cmpd="dbl">
+            <a:solidFill>
+              <a:srgbClr val="00B050"/>
+            </a:solidFill>
+          </a:ln>
+        </p:spPr>
+        <p:txBody>
+          <a:bodyPr wrap="square" rtlCol="0">
+            <a:spAutoFit/>
+          </a:bodyPr>
+          <a:lstStyle/>
+          <a:p>
+            <a:pPr marL="285750" indent="-285750">
+              <a:buFont typeface="Arial" panose="020B0604020202020204" pitchFamily="34" charset="0"/>
+              <a:buChar char="•"/>
+            </a:pPr>
+            <a:r>
+              <a:rPr lang="en-US" sz="1600" i="1" dirty="0"/>
+              <a:t>GPS</a:t>
+            </a:r>
+          </a:p>
+          <a:p>
+            <a:pPr marL="285750" indent="-285750">
+              <a:buFont typeface="Arial" panose="020B0604020202020204" pitchFamily="34" charset="0"/>
+              <a:buChar char="•"/>
+            </a:pPr>
+            <a:r>
+              <a:rPr lang="en-US" sz="1600" i="1" dirty="0"/>
+              <a:t>Scans</a:t>
+            </a:r>
+          </a:p>
+          <a:p>
+            <a:pPr marL="285750" indent="-285750">
+              <a:buFont typeface="Arial" panose="020B0604020202020204" pitchFamily="34" charset="0"/>
+              <a:buChar char="•"/>
+            </a:pPr>
+            <a:r>
+              <a:rPr lang="en-US" sz="1600" i="1" dirty="0"/>
+              <a:t>Google Earth</a:t>
+            </a:r>
+          </a:p>
+        </p:txBody>
+      </p:sp>
+      <p:sp>
+        <p:nvSpPr>
+          <p:cNvPr id="40" name="TextBox 39">
+            <a:extLst>
+              <a:ext uri="{FF2B5EF4-FFF2-40B4-BE49-F238E27FC236}">
+                <a16:creationId xmlns:a16="http://schemas.microsoft.com/office/drawing/2014/main" id="{38D5B659-326C-44D9-AA3C-B72E9B8D1C21}"/>
+              </a:ext>
+            </a:extLst>
+          </p:cNvPr>
+          <p:cNvSpPr txBox="1"/>
+          <p:nvPr/>
+        </p:nvSpPr>
+        <p:spPr>
+          <a:xfrm>
+            <a:off x="589934" y="5814245"/>
+            <a:ext cx="1504336" cy="584775"/>
+          </a:xfrm>
+          <a:prstGeom prst="rect">
+            <a:avLst/>
+          </a:prstGeom>
+          <a:noFill/>
+          <a:ln w="25400" cmpd="dbl">
+            <a:solidFill>
+              <a:srgbClr val="00B050"/>
+            </a:solidFill>
+          </a:ln>
+        </p:spPr>
+        <p:txBody>
+          <a:bodyPr wrap="square" rtlCol="0">
+            <a:spAutoFit/>
+          </a:bodyPr>
+          <a:lstStyle/>
+          <a:p>
+            <a:pPr marL="285750" indent="-285750">
+              <a:buFont typeface="Arial" panose="020B0604020202020204" pitchFamily="34" charset="0"/>
+              <a:buChar char="•"/>
+            </a:pPr>
+            <a:r>
+              <a:rPr lang="en-US" sz="1600" i="1" dirty="0"/>
+              <a:t>Piece-wise</a:t>
+            </a:r>
+          </a:p>
+          <a:p>
+            <a:pPr marL="285750" indent="-285750">
+              <a:buFont typeface="Arial" panose="020B0604020202020204" pitchFamily="34" charset="0"/>
+              <a:buChar char="•"/>
+            </a:pPr>
+            <a:r>
+              <a:rPr lang="en-US" sz="1600" i="1" dirty="0"/>
+              <a:t>Polynomial</a:t>
+            </a:r>
+          </a:p>
+        </p:txBody>
+      </p:sp>
+      <p:sp>
+        <p:nvSpPr>
+          <p:cNvPr id="46" name="TextBox 45">
+            <a:extLst>
+              <a:ext uri="{FF2B5EF4-FFF2-40B4-BE49-F238E27FC236}">
+                <a16:creationId xmlns:a16="http://schemas.microsoft.com/office/drawing/2014/main" id="{BD51FD05-D243-4088-8DFD-648CF4D606F1}"/>
+              </a:ext>
+            </a:extLst>
+          </p:cNvPr>
+          <p:cNvSpPr txBox="1"/>
+          <p:nvPr/>
+        </p:nvSpPr>
+        <p:spPr>
+          <a:xfrm>
+            <a:off x="3417940" y="1564504"/>
+            <a:ext cx="2101645" cy="830997"/>
+          </a:xfrm>
+          <a:prstGeom prst="rect">
+            <a:avLst/>
+          </a:prstGeom>
+          <a:noFill/>
+          <a:ln w="25400" cmpd="dbl">
+            <a:solidFill>
+              <a:srgbClr val="7030A0"/>
+            </a:solidFill>
+          </a:ln>
+        </p:spPr>
+        <p:txBody>
+          <a:bodyPr wrap="square" rtlCol="0">
+            <a:spAutoFit/>
+          </a:bodyPr>
+          <a:lstStyle/>
+          <a:p>
+            <a:r>
+              <a:rPr lang="en-US" sz="1600" i="1" dirty="0"/>
+              <a:t>Constraints:</a:t>
+            </a:r>
+          </a:p>
+          <a:p>
+            <a:pPr marL="285750" indent="-285750">
+              <a:buFont typeface="Arial" panose="020B0604020202020204" pitchFamily="34" charset="0"/>
+              <a:buChar char="•"/>
+            </a:pPr>
+            <a:r>
+              <a:rPr lang="en-US" sz="1600" i="1" dirty="0"/>
+              <a:t>Road Design Limits</a:t>
+            </a:r>
+          </a:p>
+        </p:txBody>
+      </p:sp>
+      <p:cxnSp>
+        <p:nvCxnSpPr>
+          <p:cNvPr id="47" name="Straight Arrow Connector 46">
+            <a:extLst>
+              <a:ext uri="{FF2B5EF4-FFF2-40B4-BE49-F238E27FC236}">
+                <a16:creationId xmlns:a16="http://schemas.microsoft.com/office/drawing/2014/main" id="{E24E299C-1081-4EE8-B0EF-5714B71C6D62}"/>
+              </a:ext>
+            </a:extLst>
+          </p:cNvPr>
+          <p:cNvCxnSpPr>
+            <a:cxnSpLocks/>
+            <a:stCxn id="46" idx="2"/>
+            <a:endCxn id="29" idx="0"/>
+          </p:cNvCxnSpPr>
+          <p:nvPr/>
+        </p:nvCxnSpPr>
+        <p:spPr bwMode="auto">
+          <a:xfrm>
+            <a:off x="4468763" y="2395501"/>
+            <a:ext cx="1795620" cy="1132744"/>
+          </a:xfrm>
+          <a:prstGeom prst="straightConnector1">
+            <a:avLst/>
+          </a:prstGeom>
+          <a:solidFill>
+            <a:schemeClr val="accent1"/>
+          </a:solidFill>
+          <a:ln w="38100" cap="flat" cmpd="sng" algn="ctr">
+            <a:solidFill>
+              <a:schemeClr val="tx2"/>
+            </a:solidFill>
+            <a:prstDash val="solid"/>
+            <a:round/>
+            <a:headEnd type="none" w="med" len="med"/>
+            <a:tailEnd type="triangle"/>
+          </a:ln>
+          <a:effectLst/>
+        </p:spPr>
+      </p:cxnSp>
+      <mc:AlternateContent xmlns:mc="http://schemas.openxmlformats.org/markup-compatibility/2006">
+        <mc:Choice xmlns:a14="http://schemas.microsoft.com/office/drawing/2010/main" Requires="a14">
+          <p:sp>
+            <p:nvSpPr>
+              <p:cNvPr id="58" name="TextBox 57">
+                <a:extLst>
+                  <a:ext uri="{FF2B5EF4-FFF2-40B4-BE49-F238E27FC236}">
+                    <a16:creationId xmlns:a16="http://schemas.microsoft.com/office/drawing/2014/main" id="{6E438DD6-682F-47AC-92BE-325C3E470290}"/>
+                  </a:ext>
+                </a:extLst>
+              </p:cNvPr>
+              <p:cNvSpPr txBox="1"/>
+              <p:nvPr/>
+            </p:nvSpPr>
+            <p:spPr>
+              <a:xfrm>
+                <a:off x="4468764" y="3357621"/>
+                <a:ext cx="862780" cy="390748"/>
+              </a:xfrm>
+              <a:prstGeom prst="rect">
+                <a:avLst/>
+              </a:prstGeom>
+              <a:noFill/>
+            </p:spPr>
+            <p:txBody>
+              <a:bodyPr wrap="square" rtlCol="0">
+                <a:spAutoFit/>
+              </a:bodyPr>
+              <a:lstStyle/>
+              <a:p>
+                <a14:m>
+                  <m:oMathPara xmlns:m="http://schemas.openxmlformats.org/officeDocument/2006/math">
+                    <m:oMathParaPr>
+                      <m:jc m:val="centerGroup"/>
+                    </m:oMathParaPr>
+                    <m:oMath xmlns:m="http://schemas.openxmlformats.org/officeDocument/2006/math">
+                      <m:sSub>
+                        <m:sSubPr>
+                          <m:ctrlPr>
+                            <a:rPr lang="en-US" b="0" i="1" smtClean="0">
+                              <a:latin typeface="Cambria Math" panose="02040503050406030204" pitchFamily="18" charset="0"/>
+                            </a:rPr>
+                          </m:ctrlPr>
+                        </m:sSubPr>
+                        <m:e>
+                          <m:r>
+                            <a:rPr lang="en-US" b="0" i="1" smtClean="0">
+                              <a:latin typeface="Cambria Math" panose="02040503050406030204" pitchFamily="18" charset="0"/>
+                            </a:rPr>
+                            <m:t>𝜅</m:t>
+                          </m:r>
+                        </m:e>
+                        <m:sub>
+                          <m:r>
+                            <a:rPr lang="en-US" b="0" i="1" smtClean="0">
+                              <a:latin typeface="Cambria Math" panose="02040503050406030204" pitchFamily="18" charset="0"/>
+                            </a:rPr>
+                            <m:t>𝑂𝑝𝑡</m:t>
+                          </m:r>
+                        </m:sub>
+                      </m:sSub>
+                      <m:r>
+                        <a:rPr lang="en-US" b="0" i="1" smtClean="0">
+                          <a:latin typeface="Cambria Math" panose="02040503050406030204" pitchFamily="18" charset="0"/>
+                        </a:rPr>
+                        <m:t>(</m:t>
+                      </m:r>
+                      <m:r>
+                        <a:rPr lang="en-US" b="0" i="1" smtClean="0">
+                          <a:latin typeface="Cambria Math" panose="02040503050406030204" pitchFamily="18" charset="0"/>
+                        </a:rPr>
+                        <m:t>𝑠</m:t>
+                      </m:r>
+                      <m:r>
+                        <a:rPr lang="en-US" b="0" i="1" smtClean="0">
+                          <a:latin typeface="Cambria Math" panose="02040503050406030204" pitchFamily="18" charset="0"/>
+                        </a:rPr>
+                        <m:t>)</m:t>
+                      </m:r>
+                    </m:oMath>
+                  </m:oMathPara>
+                </a14:m>
+                <a:endParaRPr lang="en-US" dirty="0"/>
+              </a:p>
+            </p:txBody>
+          </p:sp>
+        </mc:Choice>
+        <mc:Fallback>
+          <p:sp>
+            <p:nvSpPr>
+              <p:cNvPr id="58" name="TextBox 57">
+                <a:extLst>
+                  <a:ext uri="{FF2B5EF4-FFF2-40B4-BE49-F238E27FC236}">
+                    <a16:creationId xmlns:a16="http://schemas.microsoft.com/office/drawing/2014/main" id="{6E438DD6-682F-47AC-92BE-325C3E470290}"/>
+                  </a:ext>
+                </a:extLst>
+              </p:cNvPr>
+              <p:cNvSpPr txBox="1">
+                <a:spLocks noRot="1" noChangeAspect="1" noMove="1" noResize="1" noEditPoints="1" noAdjustHandles="1" noChangeArrowheads="1" noChangeShapeType="1" noTextEdit="1"/>
+              </p:cNvSpPr>
+              <p:nvPr/>
+            </p:nvSpPr>
+            <p:spPr>
+              <a:xfrm>
+                <a:off x="4468764" y="3357621"/>
+                <a:ext cx="862780" cy="390748"/>
+              </a:xfrm>
+              <a:prstGeom prst="rect">
+                <a:avLst/>
+              </a:prstGeom>
+              <a:blipFill>
+                <a:blip r:embed="rId5"/>
+                <a:stretch>
+                  <a:fillRect r="-8451" b="-7813"/>
+                </a:stretch>
+              </a:blipFill>
+            </p:spPr>
+            <p:txBody>
+              <a:bodyPr/>
+              <a:lstStyle/>
+              <a:p>
+                <a:r>
+                  <a:rPr lang="en-US">
+                    <a:noFill/>
+                  </a:rPr>
+                  <a:t> </a:t>
+                </a:r>
+              </a:p>
+            </p:txBody>
+          </p:sp>
+        </mc:Fallback>
+      </mc:AlternateContent>
+      <p:sp>
+        <p:nvSpPr>
+          <p:cNvPr id="73" name="TextBox 72">
+            <a:extLst>
+              <a:ext uri="{FF2B5EF4-FFF2-40B4-BE49-F238E27FC236}">
+                <a16:creationId xmlns:a16="http://schemas.microsoft.com/office/drawing/2014/main" id="{F55650D2-6E54-4B9B-8693-A58CC82500AA}"/>
+              </a:ext>
+            </a:extLst>
+          </p:cNvPr>
+          <p:cNvSpPr txBox="1"/>
+          <p:nvPr/>
+        </p:nvSpPr>
+        <p:spPr>
+          <a:xfrm>
+            <a:off x="3921228" y="5445441"/>
+            <a:ext cx="2101645" cy="830997"/>
+          </a:xfrm>
+          <a:prstGeom prst="rect">
+            <a:avLst/>
+          </a:prstGeom>
+          <a:noFill/>
+          <a:ln w="25400" cmpd="dbl">
+            <a:solidFill>
+              <a:srgbClr val="7030A0"/>
+            </a:solidFill>
+          </a:ln>
+        </p:spPr>
+        <p:txBody>
+          <a:bodyPr wrap="square" rtlCol="0">
+            <a:spAutoFit/>
+          </a:bodyPr>
+          <a:lstStyle/>
+          <a:p>
+            <a:r>
+              <a:rPr lang="en-US" sz="1600" i="1" dirty="0"/>
+              <a:t>Variables:</a:t>
+            </a:r>
+          </a:p>
+          <a:p>
+            <a:pPr marL="285750" indent="-285750">
+              <a:buFont typeface="Arial" panose="020B0604020202020204" pitchFamily="34" charset="0"/>
+              <a:buChar char="•"/>
+            </a:pPr>
+            <a:r>
+              <a:rPr lang="en-US" sz="1600" i="1" dirty="0"/>
+              <a:t>Vehicle Dynamics Limits</a:t>
+            </a:r>
+          </a:p>
+        </p:txBody>
+      </p:sp>
+      <p:cxnSp>
+        <p:nvCxnSpPr>
+          <p:cNvPr id="74" name="Straight Arrow Connector 73">
+            <a:extLst>
+              <a:ext uri="{FF2B5EF4-FFF2-40B4-BE49-F238E27FC236}">
+                <a16:creationId xmlns:a16="http://schemas.microsoft.com/office/drawing/2014/main" id="{131989AF-31A7-41AB-A6C1-760054AD789B}"/>
+              </a:ext>
+            </a:extLst>
+          </p:cNvPr>
+          <p:cNvCxnSpPr>
+            <a:cxnSpLocks/>
+            <a:stCxn id="73" idx="0"/>
+            <a:endCxn id="29" idx="2"/>
+          </p:cNvCxnSpPr>
+          <p:nvPr/>
+        </p:nvCxnSpPr>
+        <p:spPr bwMode="auto">
+          <a:xfrm flipV="1">
+            <a:off x="4972051" y="4174576"/>
+            <a:ext cx="1292332" cy="1270865"/>
+          </a:xfrm>
+          <a:prstGeom prst="straightConnector1">
+            <a:avLst/>
+          </a:prstGeom>
+          <a:solidFill>
+            <a:schemeClr val="accent1"/>
+          </a:solidFill>
+          <a:ln w="38100" cap="flat" cmpd="sng" algn="ctr">
+            <a:solidFill>
+              <a:schemeClr val="tx2"/>
+            </a:solidFill>
+            <a:prstDash val="solid"/>
+            <a:round/>
+            <a:headEnd type="none" w="med" len="med"/>
+            <a:tailEnd type="triangle"/>
+          </a:ln>
+          <a:effectLst/>
+        </p:spPr>
+      </p:cxnSp>
+      <mc:AlternateContent xmlns:mc="http://schemas.openxmlformats.org/markup-compatibility/2006">
+        <mc:Choice xmlns:a14="http://schemas.microsoft.com/office/drawing/2010/main" Requires="a14">
+          <p:sp>
+            <p:nvSpPr>
+              <p:cNvPr id="97" name="TextBox 96">
+                <a:extLst>
+                  <a:ext uri="{FF2B5EF4-FFF2-40B4-BE49-F238E27FC236}">
+                    <a16:creationId xmlns:a16="http://schemas.microsoft.com/office/drawing/2014/main" id="{EE6579B5-49B4-4712-B8A9-06415B9EA831}"/>
+                  </a:ext>
+                </a:extLst>
+              </p:cNvPr>
+              <p:cNvSpPr txBox="1"/>
+              <p:nvPr/>
+            </p:nvSpPr>
+            <p:spPr>
+              <a:xfrm>
+                <a:off x="5410815" y="2592541"/>
+                <a:ext cx="612058" cy="369332"/>
+              </a:xfrm>
+              <a:prstGeom prst="rect">
+                <a:avLst/>
+              </a:prstGeom>
+              <a:noFill/>
+            </p:spPr>
+            <p:txBody>
+              <a:bodyPr wrap="square" rtlCol="0">
+                <a:spAutoFit/>
+              </a:bodyPr>
+              <a:lstStyle/>
+              <a:p>
+                <a14:m>
+                  <m:oMathPara xmlns:m="http://schemas.openxmlformats.org/officeDocument/2006/math">
+                    <m:oMathParaPr>
+                      <m:jc m:val="centerGroup"/>
+                    </m:oMathParaPr>
+                    <m:oMath xmlns:m="http://schemas.openxmlformats.org/officeDocument/2006/math">
+                      <m:r>
+                        <a:rPr lang="en-US" b="0" i="1" smtClean="0">
+                          <a:latin typeface="Cambria Math" panose="02040503050406030204" pitchFamily="18" charset="0"/>
+                        </a:rPr>
+                        <m:t>𝜇</m:t>
+                      </m:r>
+                      <m:r>
+                        <a:rPr lang="en-US" b="0" i="1" smtClean="0">
+                          <a:latin typeface="Cambria Math" panose="02040503050406030204" pitchFamily="18" charset="0"/>
+                        </a:rPr>
+                        <m:t>,</m:t>
+                      </m:r>
+                      <m:r>
+                        <a:rPr lang="en-US" b="0" i="1" smtClean="0">
+                          <a:latin typeface="Cambria Math" panose="02040503050406030204" pitchFamily="18" charset="0"/>
+                        </a:rPr>
+                        <m:t>𝑒</m:t>
+                      </m:r>
+                      <m:r>
+                        <a:rPr lang="en-US" b="0" i="1" smtClean="0">
+                          <a:latin typeface="Cambria Math" panose="02040503050406030204" pitchFamily="18" charset="0"/>
+                        </a:rPr>
+                        <m:t> </m:t>
+                      </m:r>
+                    </m:oMath>
+                  </m:oMathPara>
+                </a14:m>
+                <a:endParaRPr lang="en-US" dirty="0"/>
+              </a:p>
+            </p:txBody>
+          </p:sp>
+        </mc:Choice>
+        <mc:Fallback>
+          <p:sp>
+            <p:nvSpPr>
+              <p:cNvPr id="97" name="TextBox 96">
+                <a:extLst>
+                  <a:ext uri="{FF2B5EF4-FFF2-40B4-BE49-F238E27FC236}">
+                    <a16:creationId xmlns:a16="http://schemas.microsoft.com/office/drawing/2014/main" id="{EE6579B5-49B4-4712-B8A9-06415B9EA831}"/>
+                  </a:ext>
+                </a:extLst>
+              </p:cNvPr>
+              <p:cNvSpPr txBox="1">
+                <a:spLocks noRot="1" noChangeAspect="1" noMove="1" noResize="1" noEditPoints="1" noAdjustHandles="1" noChangeArrowheads="1" noChangeShapeType="1" noTextEdit="1"/>
+              </p:cNvSpPr>
+              <p:nvPr/>
+            </p:nvSpPr>
+            <p:spPr>
+              <a:xfrm>
+                <a:off x="5410815" y="2592541"/>
+                <a:ext cx="612058" cy="369332"/>
+              </a:xfrm>
+              <a:prstGeom prst="rect">
+                <a:avLst/>
+              </a:prstGeom>
+              <a:blipFill>
+                <a:blip r:embed="rId6"/>
+                <a:stretch>
+                  <a:fillRect b="-4918"/>
+                </a:stretch>
+              </a:blipFill>
+            </p:spPr>
+            <p:txBody>
+              <a:bodyPr/>
+              <a:lstStyle/>
+              <a:p>
+                <a:r>
+                  <a:rPr lang="en-US">
+                    <a:noFill/>
+                  </a:rPr>
+                  <a:t> </a:t>
+                </a:r>
+              </a:p>
+            </p:txBody>
+          </p:sp>
+        </mc:Fallback>
+      </mc:AlternateContent>
+      <mc:AlternateContent xmlns:mc="http://schemas.openxmlformats.org/markup-compatibility/2006">
+        <mc:Choice xmlns:a14="http://schemas.microsoft.com/office/drawing/2010/main" Requires="a14">
+          <p:sp>
+            <p:nvSpPr>
+              <p:cNvPr id="98" name="TextBox 97">
+                <a:extLst>
+                  <a:ext uri="{FF2B5EF4-FFF2-40B4-BE49-F238E27FC236}">
+                    <a16:creationId xmlns:a16="http://schemas.microsoft.com/office/drawing/2014/main" id="{867E872D-7990-4D81-9E97-823B215DA6AE}"/>
+                  </a:ext>
+                </a:extLst>
+              </p:cNvPr>
+              <p:cNvSpPr txBox="1"/>
+              <p:nvPr/>
+            </p:nvSpPr>
+            <p:spPr>
+              <a:xfrm>
+                <a:off x="4647588" y="4684505"/>
+                <a:ext cx="612058" cy="369332"/>
+              </a:xfrm>
+              <a:prstGeom prst="rect">
+                <a:avLst/>
+              </a:prstGeom>
+              <a:noFill/>
+            </p:spPr>
+            <p:txBody>
+              <a:bodyPr wrap="square" rtlCol="0">
+                <a:spAutoFit/>
+              </a:bodyPr>
+              <a:lstStyle/>
+              <a:p>
+                <a14:m>
+                  <m:oMathPara xmlns:m="http://schemas.openxmlformats.org/officeDocument/2006/math">
+                    <m:oMathParaPr>
+                      <m:jc m:val="centerGroup"/>
+                    </m:oMathParaPr>
+                    <m:oMath xmlns:m="http://schemas.openxmlformats.org/officeDocument/2006/math">
+                      <m:r>
+                        <a:rPr lang="en-US" b="0" i="1" smtClean="0">
+                          <a:latin typeface="Cambria Math" panose="02040503050406030204" pitchFamily="18" charset="0"/>
+                        </a:rPr>
+                        <m:t>𝑣</m:t>
+                      </m:r>
+                      <m:r>
+                        <a:rPr lang="en-US" b="0" i="1" smtClean="0">
+                          <a:latin typeface="Cambria Math" panose="02040503050406030204" pitchFamily="18" charset="0"/>
+                        </a:rPr>
+                        <m:t>,</m:t>
+                      </m:r>
+                      <m:r>
+                        <a:rPr lang="en-US" b="0" i="1" smtClean="0">
+                          <a:latin typeface="Cambria Math" panose="02040503050406030204" pitchFamily="18" charset="0"/>
+                        </a:rPr>
+                        <m:t>𝛿</m:t>
+                      </m:r>
+                      <m:r>
+                        <a:rPr lang="en-US" b="0" i="1" smtClean="0">
+                          <a:latin typeface="Cambria Math" panose="02040503050406030204" pitchFamily="18" charset="0"/>
+                        </a:rPr>
+                        <m:t> </m:t>
+                      </m:r>
+                    </m:oMath>
+                  </m:oMathPara>
+                </a14:m>
+                <a:endParaRPr lang="en-US" dirty="0"/>
+              </a:p>
+            </p:txBody>
+          </p:sp>
+        </mc:Choice>
+        <mc:Fallback>
+          <p:sp>
+            <p:nvSpPr>
+              <p:cNvPr id="98" name="TextBox 97">
+                <a:extLst>
+                  <a:ext uri="{FF2B5EF4-FFF2-40B4-BE49-F238E27FC236}">
+                    <a16:creationId xmlns:a16="http://schemas.microsoft.com/office/drawing/2014/main" id="{867E872D-7990-4D81-9E97-823B215DA6AE}"/>
+                  </a:ext>
+                </a:extLst>
+              </p:cNvPr>
+              <p:cNvSpPr txBox="1">
+                <a:spLocks noRot="1" noChangeAspect="1" noMove="1" noResize="1" noEditPoints="1" noAdjustHandles="1" noChangeArrowheads="1" noChangeShapeType="1" noTextEdit="1"/>
+              </p:cNvSpPr>
+              <p:nvPr/>
+            </p:nvSpPr>
+            <p:spPr>
+              <a:xfrm>
+                <a:off x="4647588" y="4684505"/>
+                <a:ext cx="612058" cy="369332"/>
+              </a:xfrm>
+              <a:prstGeom prst="rect">
+                <a:avLst/>
+              </a:prstGeom>
+              <a:blipFill>
+                <a:blip r:embed="rId7"/>
+                <a:stretch>
+                  <a:fillRect/>
+                </a:stretch>
+              </a:blipFill>
+            </p:spPr>
+            <p:txBody>
+              <a:bodyPr/>
+              <a:lstStyle/>
+              <a:p>
+                <a:r>
+                  <a:rPr lang="en-US">
+                    <a:noFill/>
+                  </a:rPr>
+                  <a:t> </a:t>
+                </a:r>
+              </a:p>
+            </p:txBody>
+          </p:sp>
+        </mc:Fallback>
+      </mc:AlternateContent>
+      <p:cxnSp>
+        <p:nvCxnSpPr>
+          <p:cNvPr id="108" name="Straight Arrow Connector 107">
+            <a:extLst>
+              <a:ext uri="{FF2B5EF4-FFF2-40B4-BE49-F238E27FC236}">
+                <a16:creationId xmlns:a16="http://schemas.microsoft.com/office/drawing/2014/main" id="{07E58802-C915-4119-A3CB-30626821BF28}"/>
+              </a:ext>
+            </a:extLst>
+          </p:cNvPr>
+          <p:cNvCxnSpPr>
+            <a:cxnSpLocks/>
+            <a:stCxn id="29" idx="3"/>
+            <a:endCxn id="113" idx="1"/>
+          </p:cNvCxnSpPr>
+          <p:nvPr/>
+        </p:nvCxnSpPr>
+        <p:spPr bwMode="auto">
+          <a:xfrm>
+            <a:off x="7171409" y="3851411"/>
+            <a:ext cx="385306" cy="0"/>
+          </a:xfrm>
+          <a:prstGeom prst="straightConnector1">
+            <a:avLst/>
+          </a:prstGeom>
+          <a:solidFill>
+            <a:schemeClr val="accent1"/>
+          </a:solidFill>
+          <a:ln w="38100" cap="flat" cmpd="sng" algn="ctr">
+            <a:solidFill>
+              <a:schemeClr val="tx2"/>
+            </a:solidFill>
+            <a:prstDash val="solid"/>
+            <a:round/>
+            <a:headEnd type="none" w="med" len="med"/>
+            <a:tailEnd type="triangle"/>
+          </a:ln>
+          <a:effectLst/>
+        </p:spPr>
+      </p:cxnSp>
+      <mc:AlternateContent xmlns:mc="http://schemas.openxmlformats.org/markup-compatibility/2006">
+        <mc:Choice xmlns:a14="http://schemas.microsoft.com/office/drawing/2010/main" Requires="a14">
+          <p:sp>
+            <p:nvSpPr>
+              <p:cNvPr id="113" name="TextBox 112">
+                <a:extLst>
+                  <a:ext uri="{FF2B5EF4-FFF2-40B4-BE49-F238E27FC236}">
+                    <a16:creationId xmlns:a16="http://schemas.microsoft.com/office/drawing/2014/main" id="{D651D4C1-4EF4-4053-BC13-5332CB3F179B}"/>
+                  </a:ext>
+                </a:extLst>
+              </p:cNvPr>
+              <p:cNvSpPr txBox="1"/>
+              <p:nvPr/>
+            </p:nvSpPr>
+            <p:spPr>
+              <a:xfrm>
+                <a:off x="7556715" y="3528245"/>
+                <a:ext cx="1013952" cy="646331"/>
+              </a:xfrm>
+              <a:prstGeom prst="rect">
+                <a:avLst/>
+              </a:prstGeom>
+              <a:noFill/>
+              <a:ln w="25400">
+                <a:solidFill>
+                  <a:schemeClr val="accent1"/>
+                </a:solidFill>
+              </a:ln>
+            </p:spPr>
+            <p:txBody>
+              <a:bodyPr wrap="square" rtlCol="0">
+                <a:spAutoFit/>
+              </a:bodyPr>
+              <a:lstStyle/>
+              <a:p>
+                <a14:m>
+                  <m:oMathPara xmlns:m="http://schemas.openxmlformats.org/officeDocument/2006/math">
+                    <m:oMathParaPr>
+                      <m:jc m:val="centerGroup"/>
+                    </m:oMathParaPr>
+                    <m:oMath xmlns:m="http://schemas.openxmlformats.org/officeDocument/2006/math">
+                      <m:sSub>
+                        <m:sSubPr>
+                          <m:ctrlPr>
+                            <a:rPr lang="en-US" i="1" smtClean="0">
+                              <a:latin typeface="Cambria Math" panose="02040503050406030204" pitchFamily="18" charset="0"/>
+                            </a:rPr>
+                          </m:ctrlPr>
+                        </m:sSubPr>
+                        <m:e>
+                          <m:r>
+                            <a:rPr lang="en-US" i="1">
+                              <a:latin typeface="Cambria Math" panose="02040503050406030204" pitchFamily="18" charset="0"/>
+                            </a:rPr>
+                            <m:t>𝑣</m:t>
+                          </m:r>
+                        </m:e>
+                        <m:sub>
+                          <m:r>
+                            <a:rPr lang="en-US" i="1">
+                              <a:latin typeface="Cambria Math" panose="02040503050406030204" pitchFamily="18" charset="0"/>
+                            </a:rPr>
+                            <m:t>𝑖𝑑𝑒𝑎𝑙</m:t>
+                          </m:r>
+                        </m:sub>
+                      </m:sSub>
+                    </m:oMath>
+                  </m:oMathPara>
+                </a14:m>
+                <a:endParaRPr lang="en-US" dirty="0"/>
+              </a:p>
+              <a:p>
+                <a14:m>
+                  <m:oMathPara xmlns:m="http://schemas.openxmlformats.org/officeDocument/2006/math">
+                    <m:oMathParaPr>
+                      <m:jc m:val="centerGroup"/>
+                    </m:oMathParaPr>
+                    <m:oMath xmlns:m="http://schemas.openxmlformats.org/officeDocument/2006/math">
+                      <m:sSub>
+                        <m:sSubPr>
+                          <m:ctrlPr>
+                            <a:rPr lang="en-US" i="1">
+                              <a:latin typeface="Cambria Math" panose="02040503050406030204" pitchFamily="18" charset="0"/>
+                            </a:rPr>
+                          </m:ctrlPr>
+                        </m:sSubPr>
+                        <m:e>
+                          <m:r>
+                            <a:rPr lang="en-US" i="1">
+                              <a:latin typeface="Cambria Math" panose="02040503050406030204" pitchFamily="18" charset="0"/>
+                            </a:rPr>
+                            <m:t>𝛿</m:t>
+                          </m:r>
+                        </m:e>
+                        <m:sub>
+                          <m:r>
+                            <a:rPr lang="en-US" i="1">
+                              <a:latin typeface="Cambria Math" panose="02040503050406030204" pitchFamily="18" charset="0"/>
+                            </a:rPr>
+                            <m:t>𝑖𝑑𝑒𝑎𝑙</m:t>
+                          </m:r>
+                        </m:sub>
+                      </m:sSub>
+                    </m:oMath>
+                  </m:oMathPara>
+                </a14:m>
+                <a:endParaRPr lang="en-US" dirty="0"/>
+              </a:p>
+            </p:txBody>
+          </p:sp>
+        </mc:Choice>
+        <mc:Fallback>
+          <p:sp>
+            <p:nvSpPr>
+              <p:cNvPr id="113" name="TextBox 112">
+                <a:extLst>
+                  <a:ext uri="{FF2B5EF4-FFF2-40B4-BE49-F238E27FC236}">
+                    <a16:creationId xmlns:a16="http://schemas.microsoft.com/office/drawing/2014/main" id="{D651D4C1-4EF4-4053-BC13-5332CB3F179B}"/>
+                  </a:ext>
+                </a:extLst>
+              </p:cNvPr>
+              <p:cNvSpPr txBox="1">
+                <a:spLocks noRot="1" noChangeAspect="1" noMove="1" noResize="1" noEditPoints="1" noAdjustHandles="1" noChangeArrowheads="1" noChangeShapeType="1" noTextEdit="1"/>
+              </p:cNvSpPr>
+              <p:nvPr/>
+            </p:nvSpPr>
+            <p:spPr>
+              <a:xfrm>
+                <a:off x="7556715" y="3528245"/>
+                <a:ext cx="1013952" cy="646331"/>
+              </a:xfrm>
+              <a:prstGeom prst="rect">
+                <a:avLst/>
+              </a:prstGeom>
+              <a:blipFill>
+                <a:blip r:embed="rId8"/>
+                <a:stretch>
+                  <a:fillRect/>
+                </a:stretch>
+              </a:blipFill>
+              <a:ln w="25400">
+                <a:solidFill>
+                  <a:schemeClr val="accent1"/>
+                </a:solidFill>
+              </a:ln>
+            </p:spPr>
+            <p:txBody>
+              <a:bodyPr/>
+              <a:lstStyle/>
+              <a:p>
+                <a:r>
+                  <a:rPr lang="en-US">
+                    <a:noFill/>
+                  </a:rPr>
+                  <a:t> </a:t>
+                </a:r>
+              </a:p>
+            </p:txBody>
+          </p:sp>
+        </mc:Fallback>
+      </mc:AlternateContent>
+    </p:spTree>
+    <p:extLst>
+      <p:ext uri="{BB962C8B-B14F-4D97-AF65-F5344CB8AC3E}">
+        <p14:creationId xmlns:p14="http://schemas.microsoft.com/office/powerpoint/2010/main" val="3264066007"/>
+      </p:ext>
+    </p:extLst>
   </p:cSld>
   <p:clrMapOvr>
     <a:masterClrMapping/>
@@ -6022,10 +7833,232 @@
   <p:timing>
     <p:tnLst>
       <p:par>
-        <p:cTn id="1" dur="indefinite" restart="never" nodeType="tmRoot"/>
+        <p:cTn id="1" dur="indefinite" restart="never" nodeType="tmRoot">
+          <p:childTnLst>
+            <p:seq concurrent="1" nextAc="seek">
+              <p:cTn id="2" dur="indefinite" nodeType="mainSeq">
+                <p:childTnLst>
+                  <p:par>
+                    <p:cTn id="3" fill="hold">
+                      <p:stCondLst>
+                        <p:cond delay="indefinite"/>
+                      </p:stCondLst>
+                      <p:childTnLst>
+                        <p:par>
+                          <p:cTn id="4" fill="hold">
+                            <p:stCondLst>
+                              <p:cond delay="0"/>
+                            </p:stCondLst>
+                            <p:childTnLst>
+                              <p:par>
+                                <p:cTn id="5" presetID="1" presetClass="entr" presetSubtype="0" fill="hold" grpId="0" nodeType="clickEffect">
+                                  <p:stCondLst>
+                                    <p:cond delay="0"/>
+                                  </p:stCondLst>
+                                  <p:childTnLst>
+                                    <p:set>
+                                      <p:cBhvr>
+                                        <p:cTn id="6" dur="1" fill="hold">
+                                          <p:stCondLst>
+                                            <p:cond delay="0"/>
+                                          </p:stCondLst>
+                                        </p:cTn>
+                                        <p:tgtEl>
+                                          <p:spTgt spid="6"/>
+                                        </p:tgtEl>
+                                        <p:attrNameLst>
+                                          <p:attrName>style.visibility</p:attrName>
+                                        </p:attrNameLst>
+                                      </p:cBhvr>
+                                      <p:to>
+                                        <p:strVal val="visible"/>
+                                      </p:to>
+                                    </p:set>
+                                  </p:childTnLst>
+                                </p:cTn>
+                              </p:par>
+                            </p:childTnLst>
+                          </p:cTn>
+                        </p:par>
+                      </p:childTnLst>
+                    </p:cTn>
+                  </p:par>
+                  <p:par>
+                    <p:cTn id="7" fill="hold">
+                      <p:stCondLst>
+                        <p:cond delay="indefinite"/>
+                      </p:stCondLst>
+                      <p:childTnLst>
+                        <p:par>
+                          <p:cTn id="8" fill="hold">
+                            <p:stCondLst>
+                              <p:cond delay="0"/>
+                            </p:stCondLst>
+                            <p:childTnLst>
+                              <p:par>
+                                <p:cTn id="9" presetID="1" presetClass="entr" presetSubtype="0" fill="hold" grpId="0" nodeType="clickEffect">
+                                  <p:stCondLst>
+                                    <p:cond delay="0"/>
+                                  </p:stCondLst>
+                                  <p:childTnLst>
+                                    <p:set>
+                                      <p:cBhvr>
+                                        <p:cTn id="10" dur="1" fill="hold">
+                                          <p:stCondLst>
+                                            <p:cond delay="0"/>
+                                          </p:stCondLst>
+                                        </p:cTn>
+                                        <p:tgtEl>
+                                          <p:spTgt spid="46"/>
+                                        </p:tgtEl>
+                                        <p:attrNameLst>
+                                          <p:attrName>style.visibility</p:attrName>
+                                        </p:attrNameLst>
+                                      </p:cBhvr>
+                                      <p:to>
+                                        <p:strVal val="visible"/>
+                                      </p:to>
+                                    </p:set>
+                                  </p:childTnLst>
+                                </p:cTn>
+                              </p:par>
+                            </p:childTnLst>
+                          </p:cTn>
+                        </p:par>
+                      </p:childTnLst>
+                    </p:cTn>
+                  </p:par>
+                </p:childTnLst>
+              </p:cTn>
+              <p:prevCondLst>
+                <p:cond evt="onPrev" delay="0">
+                  <p:tgtEl>
+                    <p:sldTgt/>
+                  </p:tgtEl>
+                </p:cond>
+              </p:prevCondLst>
+              <p:nextCondLst>
+                <p:cond evt="onNext" delay="0">
+                  <p:tgtEl>
+                    <p:sldTgt/>
+                  </p:tgtEl>
+                </p:cond>
+              </p:nextCondLst>
+            </p:seq>
+          </p:childTnLst>
+        </p:cTn>
       </p:par>
     </p:tnLst>
+    <p:bldLst>
+      <p:bldP spid="6" grpId="0" animBg="1"/>
+      <p:bldP spid="46" grpId="0" animBg="1"/>
+    </p:bldLst>
   </p:timing>
+</p:sld>
+</file>
+
+<file path=ppt/slides/slide5.xml><?xml version="1.0" encoding="utf-8"?>
+<p:sld xmlns:a="http://schemas.openxmlformats.org/drawingml/2006/main" xmlns:r="http://schemas.openxmlformats.org/officeDocument/2006/relationships" xmlns:p="http://schemas.openxmlformats.org/presentationml/2006/main">
+  <p:cSld>
+    <p:spTree>
+      <p:nvGrpSpPr>
+        <p:cNvPr id="1" name=""/>
+        <p:cNvGrpSpPr/>
+        <p:nvPr/>
+      </p:nvGrpSpPr>
+      <p:grpSpPr>
+        <a:xfrm>
+          <a:off x="0" y="0"/>
+          <a:ext cx="0" cy="0"/>
+          <a:chOff x="0" y="0"/>
+          <a:chExt cx="0" cy="0"/>
+        </a:xfrm>
+      </p:grpSpPr>
+      <p:sp>
+        <p:nvSpPr>
+          <p:cNvPr id="2" name="Title 1">
+            <a:extLst>
+              <a:ext uri="{FF2B5EF4-FFF2-40B4-BE49-F238E27FC236}">
+                <a16:creationId xmlns:a16="http://schemas.microsoft.com/office/drawing/2014/main" id="{E7682F98-2901-4C28-B0C1-464AF270606F}"/>
+              </a:ext>
+            </a:extLst>
+          </p:cNvPr>
+          <p:cNvSpPr>
+            <a:spLocks noGrp="1"/>
+          </p:cNvSpPr>
+          <p:nvPr>
+            <p:ph type="title"/>
+          </p:nvPr>
+        </p:nvSpPr>
+        <p:spPr/>
+        <p:txBody>
+          <a:bodyPr/>
+          <a:lstStyle/>
+          <a:p>
+            <a:r>
+              <a:rPr lang="en-US" dirty="0"/>
+              <a:t>Questions?</a:t>
+            </a:r>
+          </a:p>
+        </p:txBody>
+      </p:sp>
+      <p:pic>
+        <p:nvPicPr>
+          <p:cNvPr id="3074" name="Picture 2" descr="Vector: cartoon face with question mark | Cartoon Stickman ...">
+            <a:extLst>
+              <a:ext uri="{FF2B5EF4-FFF2-40B4-BE49-F238E27FC236}">
+                <a16:creationId xmlns:a16="http://schemas.microsoft.com/office/drawing/2014/main" id="{36458387-A889-4B9C-8C51-E1696172C3BE}"/>
+              </a:ext>
+            </a:extLst>
+          </p:cNvPr>
+          <p:cNvPicPr>
+            <a:picLocks noGrp="1" noChangeAspect="1" noChangeArrowheads="1"/>
+          </p:cNvPicPr>
+          <p:nvPr>
+            <p:ph idx="1"/>
+          </p:nvPr>
+        </p:nvPicPr>
+        <p:blipFill rotWithShape="1">
+          <a:blip r:embed="rId2" cstate="print">
+            <a:extLst>
+              <a:ext uri="{28A0092B-C50C-407E-A947-70E740481C1C}">
+                <a14:useLocalDpi xmlns:a14="http://schemas.microsoft.com/office/drawing/2010/main" val="0"/>
+              </a:ext>
+            </a:extLst>
+          </a:blip>
+          <a:srcRect t="4925" b="9003"/>
+          <a:stretch/>
+        </p:blipFill>
+        <p:spPr bwMode="auto">
+          <a:xfrm>
+            <a:off x="3210133" y="1400174"/>
+            <a:ext cx="2930060" cy="5251349"/>
+          </a:xfrm>
+          <a:prstGeom prst="rect">
+            <a:avLst/>
+          </a:prstGeom>
+          <a:noFill/>
+          <a:extLst>
+            <a:ext uri="{909E8E84-426E-40DD-AFC4-6F175D3DCCD1}">
+              <a14:hiddenFill xmlns:a14="http://schemas.microsoft.com/office/drawing/2010/main">
+                <a:solidFill>
+                  <a:srgbClr val="FFFFFF"/>
+                </a:solidFill>
+              </a14:hiddenFill>
+            </a:ext>
+          </a:extLst>
+        </p:spPr>
+      </p:pic>
+    </p:spTree>
+    <p:extLst>
+      <p:ext uri="{BB962C8B-B14F-4D97-AF65-F5344CB8AC3E}">
+        <p14:creationId xmlns:p14="http://schemas.microsoft.com/office/powerpoint/2010/main" val="948398125"/>
+      </p:ext>
+    </p:extLst>
+  </p:cSld>
+  <p:clrMapOvr>
+    <a:masterClrMapping/>
+  </p:clrMapOvr>
 </p:sld>
 </file>
 

</xml_diff>